<commit_message>
Fixed judgeing bug, added image downloading on judge page and listing all images from past games
</commit_message>
<xml_diff>
--- a/Pixel Wars.pptx
+++ b/Pixel Wars.pptx
@@ -1634,14 +1634,11 @@
         <a:lstStyle/>
         <a:p>
           <a:r>
-            <a:rPr lang="en-US" sz="3700" b="1" dirty="0" smtClean="0">
+            <a:rPr lang="en-US" sz="3700" b="1" dirty="0">
               <a:latin typeface="Consolas" panose="020B0609020204030204" pitchFamily="49" charset="0"/>
             </a:rPr>
             <a:t>1 vs 1</a:t>
           </a:r>
-          <a:endParaRPr lang="en-US" sz="3700" b="1" dirty="0">
-            <a:latin typeface="Consolas" panose="020B0609020204030204" pitchFamily="49" charset="0"/>
-          </a:endParaRPr>
         </a:p>
       </dgm:t>
     </dgm:pt>
@@ -1675,14 +1672,11 @@
         <a:lstStyle/>
         <a:p>
           <a:r>
-            <a:rPr lang="en-US" dirty="0" smtClean="0">
+            <a:rPr lang="en-US" dirty="0">
               <a:latin typeface="Consolas" panose="020B0609020204030204" pitchFamily="49" charset="0"/>
             </a:rPr>
             <a:t>Join or create new game</a:t>
           </a:r>
-          <a:endParaRPr lang="en-US" dirty="0">
-            <a:latin typeface="Consolas" panose="020B0609020204030204" pitchFamily="49" charset="0"/>
-          </a:endParaRPr>
         </a:p>
       </dgm:t>
     </dgm:pt>
@@ -1716,20 +1710,16 @@
         <a:lstStyle/>
         <a:p>
           <a:r>
-            <a:rPr lang="en-US" sz="2400" dirty="0" smtClean="0">
+            <a:rPr lang="en-US" sz="2400" dirty="0">
               <a:latin typeface="Consolas" panose="020B0609020204030204" pitchFamily="49" charset="0"/>
             </a:rPr>
             <a:t>Two players                  </a:t>
           </a:r>
-          <a:r>
-            <a:rPr lang="en-US" sz="2400" dirty="0" smtClean="0"/>
-            <a:t/>
-          </a:r>
           <a:br>
-            <a:rPr lang="en-US" sz="2400" dirty="0" smtClean="0"/>
+            <a:rPr lang="en-US" sz="2400" dirty="0"/>
           </a:br>
           <a:r>
-            <a:rPr lang="en-US" sz="2400" dirty="0" smtClean="0">
+            <a:rPr lang="en-US" sz="2400" dirty="0">
               <a:latin typeface="Consolas" panose="020B0609020204030204" pitchFamily="49" charset="0"/>
             </a:rPr>
             <a:t> – one description</a:t>
@@ -1737,20 +1727,16 @@
         </a:p>
         <a:p>
           <a:r>
-            <a:rPr lang="en-US" sz="2400" dirty="0" smtClean="0">
+            <a:rPr lang="en-US" sz="2400" dirty="0">
               <a:latin typeface="Consolas" panose="020B0609020204030204" pitchFamily="49" charset="0"/>
             </a:rPr>
             <a:t>One description               </a:t>
           </a:r>
-          <a:r>
-            <a:rPr lang="en-US" sz="2400" dirty="0" smtClean="0"/>
-            <a:t/>
-          </a:r>
           <a:br>
-            <a:rPr lang="en-US" sz="2400" dirty="0" smtClean="0"/>
+            <a:rPr lang="en-US" sz="2400" dirty="0"/>
           </a:br>
           <a:r>
-            <a:rPr lang="en-US" sz="2400" dirty="0" smtClean="0">
+            <a:rPr lang="en-US" sz="2400" dirty="0">
               <a:latin typeface="Consolas" panose="020B0609020204030204" pitchFamily="49" charset="0"/>
             </a:rPr>
             <a:t>– two pictures</a:t>
@@ -1758,20 +1744,16 @@
         </a:p>
         <a:p>
           <a:r>
-            <a:rPr lang="en-US" sz="2400" dirty="0" smtClean="0">
+            <a:rPr lang="en-US" sz="2400" dirty="0">
               <a:latin typeface="Consolas" panose="020B0609020204030204" pitchFamily="49" charset="0"/>
             </a:rPr>
             <a:t>Two pictures</a:t>
           </a:r>
-          <a:r>
-            <a:rPr lang="en-US" sz="2400" dirty="0" smtClean="0"/>
-            <a:t/>
-          </a:r>
           <a:br>
-            <a:rPr lang="en-US" sz="2400" dirty="0" smtClean="0"/>
+            <a:rPr lang="en-US" sz="2400" dirty="0"/>
           </a:br>
           <a:r>
-            <a:rPr lang="en-US" sz="2400" dirty="0" smtClean="0">
+            <a:rPr lang="en-US" sz="2400" dirty="0">
               <a:latin typeface="Consolas" panose="020B0609020204030204" pitchFamily="49" charset="0"/>
             </a:rPr>
             <a:t>- two points of view</a:t>
@@ -1779,7 +1761,7 @@
         </a:p>
         <a:p>
           <a:r>
-            <a:rPr lang="en-US" sz="2400" dirty="0" smtClean="0">
+            <a:rPr lang="en-US" sz="2400" dirty="0">
               <a:latin typeface="Consolas" panose="020B0609020204030204" pitchFamily="49" charset="0"/>
             </a:rPr>
             <a:t>Two points of view                                     - one winner</a:t>
@@ -1787,19 +1769,19 @@
         </a:p>
         <a:p>
           <a:r>
-            <a:rPr lang="en-US" sz="2400" dirty="0" smtClean="0">
+            <a:rPr lang="en-US" sz="2400" dirty="0">
               <a:latin typeface="Consolas" panose="020B0609020204030204" pitchFamily="49" charset="0"/>
             </a:rPr>
-            <a:t>One winner                    – everybody happy☺  </a:t>
+            <a:t>One winner                    – everybody - happy☺  </a:t>
           </a:r>
         </a:p>
         <a:p>
-          <a:endParaRPr lang="en-US" sz="2400" dirty="0" smtClean="0">
+          <a:endParaRPr lang="en-US" sz="2400" dirty="0">
             <a:latin typeface="Consolas" panose="020B0609020204030204" pitchFamily="49" charset="0"/>
           </a:endParaRPr>
         </a:p>
         <a:p>
-          <a:endParaRPr lang="en-US" sz="2400" dirty="0" smtClean="0">
+          <a:endParaRPr lang="en-US" sz="2400" dirty="0">
             <a:latin typeface="Consolas" panose="020B0609020204030204" pitchFamily="49" charset="0"/>
           </a:endParaRPr>
         </a:p>
@@ -1843,13 +1825,6 @@
         </dgm:presLayoutVars>
       </dgm:prSet>
       <dgm:spPr/>
-      <dgm:t>
-        <a:bodyPr/>
-        <a:lstStyle/>
-        <a:p>
-          <a:endParaRPr lang="en-US"/>
-        </a:p>
-      </dgm:t>
     </dgm:pt>
     <dgm:pt modelId="{AFB80B00-26F7-43C5-A674-1E842EFBCFB4}" type="pres">
       <dgm:prSet presAssocID="{B7D7A145-1B20-4E3F-965A-D477E7E1AF39}" presName="composite" presStyleCnt="0"/>
@@ -1864,13 +1839,6 @@
         </dgm:presLayoutVars>
       </dgm:prSet>
       <dgm:spPr/>
-      <dgm:t>
-        <a:bodyPr/>
-        <a:lstStyle/>
-        <a:p>
-          <a:endParaRPr lang="en-US"/>
-        </a:p>
-      </dgm:t>
     </dgm:pt>
     <dgm:pt modelId="{C55E9AD8-191F-4354-84EF-608074F36243}" type="pres">
       <dgm:prSet presAssocID="{B7D7A145-1B20-4E3F-965A-D477E7E1AF39}" presName="Parent" presStyleLbl="alignNode1" presStyleIdx="0" presStyleCnt="1" custScaleX="193816" custScaleY="106997" custLinFactNeighborX="28516">
@@ -1881,13 +1849,6 @@
         </dgm:presLayoutVars>
       </dgm:prSet>
       <dgm:spPr/>
-      <dgm:t>
-        <a:bodyPr/>
-        <a:lstStyle/>
-        <a:p>
-          <a:endParaRPr lang="en-US"/>
-        </a:p>
-      </dgm:t>
     </dgm:pt>
     <dgm:pt modelId="{E56F5899-DB03-4EC6-9B4E-6C2B8DF236C1}" type="pres">
       <dgm:prSet presAssocID="{B7D7A145-1B20-4E3F-965A-D477E7E1AF39}" presName="Accent" presStyleLbl="parChTrans1D1" presStyleIdx="0" presStyleCnt="1"/>
@@ -1902,23 +1863,16 @@
         </dgm:presLayoutVars>
       </dgm:prSet>
       <dgm:spPr/>
-      <dgm:t>
-        <a:bodyPr/>
-        <a:lstStyle/>
-        <a:p>
-          <a:endParaRPr lang="en-US"/>
-        </a:p>
-      </dgm:t>
     </dgm:pt>
   </dgm:ptLst>
   <dgm:cxnLst>
+    <dgm:cxn modelId="{8CFB4200-AB26-4081-8776-52E4D5335C5A}" type="presOf" srcId="{B7D7A145-1B20-4E3F-965A-D477E7E1AF39}" destId="{C55E9AD8-191F-4354-84EF-608074F36243}" srcOrd="0" destOrd="0" presId="urn:microsoft.com/office/officeart/2011/layout/TabList"/>
+    <dgm:cxn modelId="{0815E70E-CA78-4023-BB27-0357ED740D1E}" srcId="{B7D7A145-1B20-4E3F-965A-D477E7E1AF39}" destId="{AD7FE4ED-6282-4C8B-8FC8-D51E5264A763}" srcOrd="1" destOrd="0" parTransId="{3C8A262E-630B-4B0C-9E25-EA718789A750}" sibTransId="{C6A50A64-7FA9-4CFB-B1D7-F003C8E7809E}"/>
+    <dgm:cxn modelId="{D49B6D19-118B-4B69-9565-E715C66751B3}" srcId="{B7D7A145-1B20-4E3F-965A-D477E7E1AF39}" destId="{068F869A-EC45-4F2A-9F54-296EAF05C825}" srcOrd="0" destOrd="0" parTransId="{E8D6960E-4DA9-4F97-AF03-9F8E9408CB75}" sibTransId="{78E78D06-FA0D-48E9-87D9-DCB80E3F60E4}"/>
+    <dgm:cxn modelId="{F92CB233-243D-4748-B8BF-F07756FF3A4C}" srcId="{25829701-67D5-4AD8-9203-976283D7E1CF}" destId="{B7D7A145-1B20-4E3F-965A-D477E7E1AF39}" srcOrd="0" destOrd="0" parTransId="{0D76D7A1-AD94-43E7-882C-8F28C03FDAA7}" sibTransId="{718F558E-B8D9-4B49-B667-286558C2AAA9}"/>
+    <dgm:cxn modelId="{8BDB5666-4175-4468-8B63-50CEC81DAAC7}" type="presOf" srcId="{25829701-67D5-4AD8-9203-976283D7E1CF}" destId="{122C77EF-AD3C-4E18-9EF3-FA9337EAA2D7}" srcOrd="0" destOrd="0" presId="urn:microsoft.com/office/officeart/2011/layout/TabList"/>
+    <dgm:cxn modelId="{9B77F653-45BA-4938-9467-5E9CAFC8CDD0}" type="presOf" srcId="{068F869A-EC45-4F2A-9F54-296EAF05C825}" destId="{B284E424-89E7-4A99-B748-4DCE58153750}" srcOrd="0" destOrd="0" presId="urn:microsoft.com/office/officeart/2011/layout/TabList"/>
     <dgm:cxn modelId="{313E0AC1-C303-461B-90FD-6125C1FA2C68}" type="presOf" srcId="{AD7FE4ED-6282-4C8B-8FC8-D51E5264A763}" destId="{DA18F163-C48C-4636-B40F-FE6CA799FFAA}" srcOrd="0" destOrd="0" presId="urn:microsoft.com/office/officeart/2011/layout/TabList"/>
-    <dgm:cxn modelId="{0815E70E-CA78-4023-BB27-0357ED740D1E}" srcId="{B7D7A145-1B20-4E3F-965A-D477E7E1AF39}" destId="{AD7FE4ED-6282-4C8B-8FC8-D51E5264A763}" srcOrd="1" destOrd="0" parTransId="{3C8A262E-630B-4B0C-9E25-EA718789A750}" sibTransId="{C6A50A64-7FA9-4CFB-B1D7-F003C8E7809E}"/>
-    <dgm:cxn modelId="{8BDB5666-4175-4468-8B63-50CEC81DAAC7}" type="presOf" srcId="{25829701-67D5-4AD8-9203-976283D7E1CF}" destId="{122C77EF-AD3C-4E18-9EF3-FA9337EAA2D7}" srcOrd="0" destOrd="0" presId="urn:microsoft.com/office/officeart/2011/layout/TabList"/>
-    <dgm:cxn modelId="{8CFB4200-AB26-4081-8776-52E4D5335C5A}" type="presOf" srcId="{B7D7A145-1B20-4E3F-965A-D477E7E1AF39}" destId="{C55E9AD8-191F-4354-84EF-608074F36243}" srcOrd="0" destOrd="0" presId="urn:microsoft.com/office/officeart/2011/layout/TabList"/>
-    <dgm:cxn modelId="{F92CB233-243D-4748-B8BF-F07756FF3A4C}" srcId="{25829701-67D5-4AD8-9203-976283D7E1CF}" destId="{B7D7A145-1B20-4E3F-965A-D477E7E1AF39}" srcOrd="0" destOrd="0" parTransId="{0D76D7A1-AD94-43E7-882C-8F28C03FDAA7}" sibTransId="{718F558E-B8D9-4B49-B667-286558C2AAA9}"/>
-    <dgm:cxn modelId="{D49B6D19-118B-4B69-9565-E715C66751B3}" srcId="{B7D7A145-1B20-4E3F-965A-D477E7E1AF39}" destId="{068F869A-EC45-4F2A-9F54-296EAF05C825}" srcOrd="0" destOrd="0" parTransId="{E8D6960E-4DA9-4F97-AF03-9F8E9408CB75}" sibTransId="{78E78D06-FA0D-48E9-87D9-DCB80E3F60E4}"/>
-    <dgm:cxn modelId="{9B77F653-45BA-4938-9467-5E9CAFC8CDD0}" type="presOf" srcId="{068F869A-EC45-4F2A-9F54-296EAF05C825}" destId="{B284E424-89E7-4A99-B748-4DCE58153750}" srcOrd="0" destOrd="0" presId="urn:microsoft.com/office/officeart/2011/layout/TabList"/>
     <dgm:cxn modelId="{BFE7DB8F-7123-4C89-8AD9-C7AD7A7A42A2}" type="presParOf" srcId="{122C77EF-AD3C-4E18-9EF3-FA9337EAA2D7}" destId="{AFB80B00-26F7-43C5-A674-1E842EFBCFB4}" srcOrd="0" destOrd="0" presId="urn:microsoft.com/office/officeart/2011/layout/TabList"/>
     <dgm:cxn modelId="{9B8CF682-CE30-41C7-A8AD-122CE21E5A5C}" type="presParOf" srcId="{AFB80B00-26F7-43C5-A674-1E842EFBCFB4}" destId="{B284E424-89E7-4A99-B748-4DCE58153750}" srcOrd="0" destOrd="0" presId="urn:microsoft.com/office/officeart/2011/layout/TabList"/>
     <dgm:cxn modelId="{0A472636-DA17-46C0-AB90-6EFE702B7308}" type="presParOf" srcId="{AFB80B00-26F7-43C5-A674-1E842EFBCFB4}" destId="{C55E9AD8-191F-4354-84EF-608074F36243}" srcOrd="1" destOrd="0" presId="urn:microsoft.com/office/officeart/2011/layout/TabList"/>
@@ -1957,14 +1911,11 @@
         <a:lstStyle/>
         <a:p>
           <a:r>
-            <a:rPr lang="en-US" sz="3700" b="1" dirty="0" err="1" smtClean="0">
+            <a:rPr lang="en-US" sz="3700" b="1" dirty="0">
               <a:latin typeface="Consolas" panose="020B0609020204030204" pitchFamily="49" charset="0"/>
             </a:rPr>
-            <a:t>Tornament</a:t>
+            <a:t>Tournament</a:t>
           </a:r>
-          <a:endParaRPr lang="en-US" sz="3700" b="1" dirty="0">
-            <a:latin typeface="Consolas" panose="020B0609020204030204" pitchFamily="49" charset="0"/>
-          </a:endParaRPr>
         </a:p>
       </dgm:t>
     </dgm:pt>
@@ -1999,14 +1950,11 @@
         <a:p>
           <a:pPr algn="ctr"/>
           <a:r>
-            <a:rPr lang="en-US" sz="2400" b="1" dirty="0" smtClean="0">
+            <a:rPr lang="en-US" sz="2400" b="1" dirty="0">
               <a:latin typeface="Consolas" panose="020B0609020204030204" pitchFamily="49" charset="0"/>
             </a:rPr>
             <a:t>Join a tournament every Sunday.</a:t>
           </a:r>
-          <a:endParaRPr lang="en-US" sz="2400" b="1" dirty="0">
-            <a:latin typeface="Consolas" panose="020B0609020204030204" pitchFamily="49" charset="0"/>
-          </a:endParaRPr>
         </a:p>
       </dgm:t>
     </dgm:pt>
@@ -2085,14 +2033,11 @@
             </a:spcAft>
           </a:pPr>
           <a:r>
-            <a:rPr lang="en-US" sz="2400" dirty="0" smtClean="0">
+            <a:rPr lang="en-US" sz="2400" dirty="0">
               <a:latin typeface="Consolas" panose="020B0609020204030204" pitchFamily="49" charset="0"/>
             </a:rPr>
             <a:t>First round                  – one description</a:t>
           </a:r>
-          <a:endParaRPr lang="en-US" sz="2400" dirty="0">
-            <a:latin typeface="Consolas" panose="020B0609020204030204" pitchFamily="49" charset="0"/>
-          </a:endParaRPr>
         </a:p>
       </dgm:t>
     </dgm:pt>
@@ -2131,14 +2076,11 @@
             </a:spcAft>
           </a:pPr>
           <a:r>
-            <a:rPr lang="en-US" sz="2400" dirty="0" smtClean="0">
+            <a:rPr lang="en-US" sz="2400" dirty="0">
               <a:latin typeface="Consolas" panose="020B0609020204030204" pitchFamily="49" charset="0"/>
             </a:rPr>
             <a:t>Second round</a:t>
           </a:r>
-          <a:endParaRPr lang="en-US" sz="2400" dirty="0">
-            <a:latin typeface="Consolas" panose="020B0609020204030204" pitchFamily="49" charset="0"/>
-          </a:endParaRPr>
         </a:p>
       </dgm:t>
     </dgm:pt>
@@ -2177,14 +2119,11 @@
             </a:spcAft>
           </a:pPr>
           <a:r>
-            <a:rPr lang="en-US" sz="2400" dirty="0" smtClean="0">
+            <a:rPr lang="en-US" sz="2400" dirty="0">
               <a:latin typeface="Consolas" panose="020B0609020204030204" pitchFamily="49" charset="0"/>
             </a:rPr>
             <a:t>Most important rule:</a:t>
           </a:r>
-          <a:endParaRPr lang="en-US" sz="2400" dirty="0">
-            <a:latin typeface="Consolas" panose="020B0609020204030204" pitchFamily="49" charset="0"/>
-          </a:endParaRPr>
         </a:p>
       </dgm:t>
     </dgm:pt>
@@ -2223,14 +2162,11 @@
             </a:spcAft>
           </a:pPr>
           <a:r>
-            <a:rPr lang="en-US" sz="2400" dirty="0" smtClean="0">
+            <a:rPr lang="en-US" sz="2400" dirty="0">
               <a:latin typeface="Consolas" panose="020B0609020204030204" pitchFamily="49" charset="0"/>
             </a:rPr>
             <a:t>4 players                    – 2 rounds</a:t>
           </a:r>
-          <a:endParaRPr lang="en-US" sz="2400" dirty="0">
-            <a:latin typeface="Consolas" panose="020B0609020204030204" pitchFamily="49" charset="0"/>
-          </a:endParaRPr>
         </a:p>
       </dgm:t>
     </dgm:pt>
@@ -2269,14 +2205,11 @@
             </a:spcAft>
           </a:pPr>
           <a:r>
-            <a:rPr lang="en-US" sz="2400" dirty="0" smtClean="0">
+            <a:rPr lang="en-US" sz="2400" dirty="0">
               <a:latin typeface="Consolas" panose="020B0609020204030204" pitchFamily="49" charset="0"/>
             </a:rPr>
             <a:t>Judge – the admin</a:t>
           </a:r>
-          <a:endParaRPr lang="en-US" sz="2400" dirty="0">
-            <a:latin typeface="Consolas" panose="020B0609020204030204" pitchFamily="49" charset="0"/>
-          </a:endParaRPr>
         </a:p>
       </dgm:t>
     </dgm:pt>
@@ -2315,24 +2248,35 @@
             </a:spcAft>
           </a:pPr>
           <a:r>
-            <a:rPr lang="en-US" sz="2400" dirty="0" smtClean="0">
+            <a:rPr lang="en-US" sz="2400" dirty="0">
               <a:latin typeface="Consolas" panose="020B0609020204030204" pitchFamily="49" charset="0"/>
             </a:rPr>
             <a:t>– second description </a:t>
           </a:r>
-          <a:endParaRPr lang="en-US" sz="2400" dirty="0">
-            <a:latin typeface="Consolas" panose="020B0609020204030204" pitchFamily="49" charset="0"/>
-          </a:endParaRPr>
         </a:p>
       </dgm:t>
     </dgm:pt>
     <dgm:pt modelId="{5B8E8DF8-C360-4925-9863-07359607798D}" type="parTrans" cxnId="{273660DC-DE6B-4A88-8AFA-F03B1073E0F7}">
       <dgm:prSet/>
       <dgm:spPr/>
+      <dgm:t>
+        <a:bodyPr/>
+        <a:lstStyle/>
+        <a:p>
+          <a:endParaRPr lang="en-US"/>
+        </a:p>
+      </dgm:t>
     </dgm:pt>
     <dgm:pt modelId="{492D804A-CCA5-45C2-8C01-E6381591EDA8}" type="sibTrans" cxnId="{273660DC-DE6B-4A88-8AFA-F03B1073E0F7}">
       <dgm:prSet/>
       <dgm:spPr/>
+      <dgm:t>
+        <a:bodyPr/>
+        <a:lstStyle/>
+        <a:p>
+          <a:endParaRPr lang="en-US"/>
+        </a:p>
+      </dgm:t>
     </dgm:pt>
     <dgm:pt modelId="{122C77EF-AD3C-4E18-9EF3-FA9337EAA2D7}" type="pres">
       <dgm:prSet presAssocID="{25829701-67D5-4AD8-9203-976283D7E1CF}" presName="Name0" presStyleCnt="0">
@@ -2345,13 +2289,6 @@
         </dgm:presLayoutVars>
       </dgm:prSet>
       <dgm:spPr/>
-      <dgm:t>
-        <a:bodyPr/>
-        <a:lstStyle/>
-        <a:p>
-          <a:endParaRPr lang="en-US"/>
-        </a:p>
-      </dgm:t>
     </dgm:pt>
     <dgm:pt modelId="{AFB80B00-26F7-43C5-A674-1E842EFBCFB4}" type="pres">
       <dgm:prSet presAssocID="{B7D7A145-1B20-4E3F-965A-D477E7E1AF39}" presName="composite" presStyleCnt="0"/>
@@ -2366,16 +2303,9 @@
         </dgm:presLayoutVars>
       </dgm:prSet>
       <dgm:spPr/>
-      <dgm:t>
-        <a:bodyPr/>
-        <a:lstStyle/>
-        <a:p>
-          <a:endParaRPr lang="en-US"/>
-        </a:p>
-      </dgm:t>
     </dgm:pt>
     <dgm:pt modelId="{C55E9AD8-191F-4354-84EF-608074F36243}" type="pres">
-      <dgm:prSet presAssocID="{B7D7A145-1B20-4E3F-965A-D477E7E1AF39}" presName="Parent" presStyleLbl="alignNode1" presStyleIdx="0" presStyleCnt="1" custScaleX="193816" custScaleY="106997" custLinFactNeighborX="28516">
+      <dgm:prSet presAssocID="{B7D7A145-1B20-4E3F-965A-D477E7E1AF39}" presName="Parent" presStyleLbl="alignNode1" presStyleIdx="0" presStyleCnt="1" custScaleX="222194" custScaleY="106997" custLinFactNeighborX="-8158" custLinFactNeighborY="-4100">
         <dgm:presLayoutVars>
           <dgm:chMax val="3"/>
           <dgm:chPref val="3"/>
@@ -2383,13 +2313,6 @@
         </dgm:presLayoutVars>
       </dgm:prSet>
       <dgm:spPr/>
-      <dgm:t>
-        <a:bodyPr/>
-        <a:lstStyle/>
-        <a:p>
-          <a:endParaRPr lang="en-US"/>
-        </a:p>
-      </dgm:t>
     </dgm:pt>
     <dgm:pt modelId="{E56F5899-DB03-4EC6-9B4E-6C2B8DF236C1}" type="pres">
       <dgm:prSet presAssocID="{B7D7A145-1B20-4E3F-965A-D477E7E1AF39}" presName="Accent" presStyleLbl="parChTrans1D1" presStyleIdx="0" presStyleCnt="1"/>
@@ -2404,35 +2327,28 @@
         </dgm:presLayoutVars>
       </dgm:prSet>
       <dgm:spPr/>
-      <dgm:t>
-        <a:bodyPr/>
-        <a:lstStyle/>
-        <a:p>
-          <a:endParaRPr lang="en-US"/>
-        </a:p>
-      </dgm:t>
     </dgm:pt>
   </dgm:ptLst>
   <dgm:cxnLst>
-    <dgm:cxn modelId="{1CAA3F65-7496-4B0B-B9B6-22043DFF8E87}" type="presOf" srcId="{A9D74A0A-04BB-4B0F-B0D4-F9DA95256540}" destId="{DA18F163-C48C-4636-B40F-FE6CA799FFAA}" srcOrd="0" destOrd="4" presId="urn:microsoft.com/office/officeart/2011/layout/TabList"/>
     <dgm:cxn modelId="{0815E70E-CA78-4023-BB27-0357ED740D1E}" srcId="{B7D7A145-1B20-4E3F-965A-D477E7E1AF39}" destId="{AD7FE4ED-6282-4C8B-8FC8-D51E5264A763}" srcOrd="2" destOrd="0" parTransId="{3C8A262E-630B-4B0C-9E25-EA718789A750}" sibTransId="{C6A50A64-7FA9-4CFB-B1D7-F003C8E7809E}"/>
-    <dgm:cxn modelId="{74F1326E-39C3-4CB1-9113-35FB2E0D33B5}" srcId="{B7D7A145-1B20-4E3F-965A-D477E7E1AF39}" destId="{A9D74A0A-04BB-4B0F-B0D4-F9DA95256540}" srcOrd="5" destOrd="0" parTransId="{0820DD99-12E8-4025-9C8D-C57D99E36B38}" sibTransId="{BEE1CD86-B0AC-4DBB-9D91-21EEE50EA1BB}"/>
-    <dgm:cxn modelId="{1EF4AAD7-3604-40EA-AA10-11590E42B796}" type="presOf" srcId="{E677D5A6-9ABD-4780-8E71-FC9B38725E77}" destId="{DA18F163-C48C-4636-B40F-FE6CA799FFAA}" srcOrd="0" destOrd="5" presId="urn:microsoft.com/office/officeart/2011/layout/TabList"/>
-    <dgm:cxn modelId="{BC708FC0-72B5-443A-8266-139A350493F2}" srcId="{B7D7A145-1B20-4E3F-965A-D477E7E1AF39}" destId="{101D8288-5B00-4C84-BFDB-D9DCA6A3267C}" srcOrd="1" destOrd="0" parTransId="{4BBE1356-A602-4BAD-924C-B903BB623AF9}" sibTransId="{EF58D793-AAF4-48BB-BA70-D5FC981188E4}"/>
-    <dgm:cxn modelId="{FF330AE9-D902-4D27-B60D-96F972014730}" type="presOf" srcId="{2B5232CF-8111-4179-B698-288AE4344A91}" destId="{DA18F163-C48C-4636-B40F-FE6CA799FFAA}" srcOrd="0" destOrd="2" presId="urn:microsoft.com/office/officeart/2011/layout/TabList"/>
+    <dgm:cxn modelId="{D49B6D19-118B-4B69-9565-E715C66751B3}" srcId="{B7D7A145-1B20-4E3F-965A-D477E7E1AF39}" destId="{068F869A-EC45-4F2A-9F54-296EAF05C825}" srcOrd="0" destOrd="0" parTransId="{E8D6960E-4DA9-4F97-AF03-9F8E9408CB75}" sibTransId="{78E78D06-FA0D-48E9-87D9-DCB80E3F60E4}"/>
     <dgm:cxn modelId="{7E327822-7A04-44A7-88F8-E2B2D6776BF7}" type="presOf" srcId="{AD7FE4ED-6282-4C8B-8FC8-D51E5264A763}" destId="{DA18F163-C48C-4636-B40F-FE6CA799FFAA}" srcOrd="0" destOrd="1" presId="urn:microsoft.com/office/officeart/2011/layout/TabList"/>
-    <dgm:cxn modelId="{273660DC-DE6B-4A88-8AFA-F03B1073E0F7}" srcId="{B7D7A145-1B20-4E3F-965A-D477E7E1AF39}" destId="{E677D5A6-9ABD-4780-8E71-FC9B38725E77}" srcOrd="6" destOrd="0" parTransId="{5B8E8DF8-C360-4925-9863-07359607798D}" sibTransId="{492D804A-CCA5-45C2-8C01-E6381591EDA8}"/>
+    <dgm:cxn modelId="{F92CB233-243D-4748-B8BF-F07756FF3A4C}" srcId="{25829701-67D5-4AD8-9203-976283D7E1CF}" destId="{B7D7A145-1B20-4E3F-965A-D477E7E1AF39}" srcOrd="0" destOrd="0" parTransId="{0D76D7A1-AD94-43E7-882C-8F28C03FDAA7}" sibTransId="{718F558E-B8D9-4B49-B667-286558C2AAA9}"/>
     <dgm:cxn modelId="{BB1BCB5D-AE8F-40BD-A9FE-C3567E7ACA68}" type="presOf" srcId="{101D8288-5B00-4C84-BFDB-D9DCA6A3267C}" destId="{DA18F163-C48C-4636-B40F-FE6CA799FFAA}" srcOrd="0" destOrd="0" presId="urn:microsoft.com/office/officeart/2011/layout/TabList"/>
-    <dgm:cxn modelId="{D49B6D19-118B-4B69-9565-E715C66751B3}" srcId="{B7D7A145-1B20-4E3F-965A-D477E7E1AF39}" destId="{068F869A-EC45-4F2A-9F54-296EAF05C825}" srcOrd="0" destOrd="0" parTransId="{E8D6960E-4DA9-4F97-AF03-9F8E9408CB75}" sibTransId="{78E78D06-FA0D-48E9-87D9-DCB80E3F60E4}"/>
-    <dgm:cxn modelId="{E713DBAB-B7A6-44FA-9149-5F73EF482C7D}" type="presOf" srcId="{25829701-67D5-4AD8-9203-976283D7E1CF}" destId="{122C77EF-AD3C-4E18-9EF3-FA9337EAA2D7}" srcOrd="0" destOrd="0" presId="urn:microsoft.com/office/officeart/2011/layout/TabList"/>
-    <dgm:cxn modelId="{72395CF8-1EF6-42C6-AE08-5AE249166A90}" type="presOf" srcId="{B7D7A145-1B20-4E3F-965A-D477E7E1AF39}" destId="{C55E9AD8-191F-4354-84EF-608074F36243}" srcOrd="0" destOrd="0" presId="urn:microsoft.com/office/officeart/2011/layout/TabList"/>
-    <dgm:cxn modelId="{17F531BC-5454-4906-95FB-437D14C09CFE}" type="presOf" srcId="{068F869A-EC45-4F2A-9F54-296EAF05C825}" destId="{B284E424-89E7-4A99-B748-4DCE58153750}" srcOrd="0" destOrd="0" presId="urn:microsoft.com/office/officeart/2011/layout/TabList"/>
-    <dgm:cxn modelId="{6D98208B-CA80-4481-9918-2F47ED3FBFE5}" type="presOf" srcId="{0BDD7853-7695-461C-8B2F-CA5AC439C3D2}" destId="{DA18F163-C48C-4636-B40F-FE6CA799FFAA}" srcOrd="0" destOrd="6" presId="urn:microsoft.com/office/officeart/2011/layout/TabList"/>
-    <dgm:cxn modelId="{F92CB233-243D-4748-B8BF-F07756FF3A4C}" srcId="{25829701-67D5-4AD8-9203-976283D7E1CF}" destId="{B7D7A145-1B20-4E3F-965A-D477E7E1AF39}" srcOrd="0" destOrd="0" parTransId="{0D76D7A1-AD94-43E7-882C-8F28C03FDAA7}" sibTransId="{718F558E-B8D9-4B49-B667-286558C2AAA9}"/>
-    <dgm:cxn modelId="{B6AB2897-628C-43DA-8858-6F2FF216D259}" srcId="{B7D7A145-1B20-4E3F-965A-D477E7E1AF39}" destId="{0BDD7853-7695-461C-8B2F-CA5AC439C3D2}" srcOrd="7" destOrd="0" parTransId="{CDD6C182-CFA2-41AE-8475-A623D7419FD8}" sibTransId="{DED65B35-C36B-4371-81C3-CEEDF7E0BB08}"/>
-    <dgm:cxn modelId="{DD969451-65E0-4D8F-AEDE-6A210586E014}" srcId="{B7D7A145-1B20-4E3F-965A-D477E7E1AF39}" destId="{2B5232CF-8111-4179-B698-288AE4344A91}" srcOrd="3" destOrd="0" parTransId="{7FCA73E5-4ADC-4493-B79B-B2548F992FB2}" sibTransId="{74A78E02-A9D0-4F6F-B953-015557C32742}"/>
     <dgm:cxn modelId="{BB1A4541-761B-4DF8-82D7-E0F2F22F8202}" srcId="{B7D7A145-1B20-4E3F-965A-D477E7E1AF39}" destId="{71869158-63DE-4394-907A-19EAC56CFC41}" srcOrd="4" destOrd="0" parTransId="{153FA0DD-4868-488A-BDA0-2C515F3DCBD9}" sibTransId="{4698867D-5907-4247-95E4-468E6510BE71}"/>
     <dgm:cxn modelId="{65DA2965-A2C9-4A8E-B561-7EAA786F5461}" type="presOf" srcId="{71869158-63DE-4394-907A-19EAC56CFC41}" destId="{DA18F163-C48C-4636-B40F-FE6CA799FFAA}" srcOrd="0" destOrd="3" presId="urn:microsoft.com/office/officeart/2011/layout/TabList"/>
+    <dgm:cxn modelId="{1CAA3F65-7496-4B0B-B9B6-22043DFF8E87}" type="presOf" srcId="{A9D74A0A-04BB-4B0F-B0D4-F9DA95256540}" destId="{DA18F163-C48C-4636-B40F-FE6CA799FFAA}" srcOrd="0" destOrd="4" presId="urn:microsoft.com/office/officeart/2011/layout/TabList"/>
+    <dgm:cxn modelId="{74F1326E-39C3-4CB1-9113-35FB2E0D33B5}" srcId="{B7D7A145-1B20-4E3F-965A-D477E7E1AF39}" destId="{A9D74A0A-04BB-4B0F-B0D4-F9DA95256540}" srcOrd="5" destOrd="0" parTransId="{0820DD99-12E8-4025-9C8D-C57D99E36B38}" sibTransId="{BEE1CD86-B0AC-4DBB-9D91-21EEE50EA1BB}"/>
+    <dgm:cxn modelId="{DD969451-65E0-4D8F-AEDE-6A210586E014}" srcId="{B7D7A145-1B20-4E3F-965A-D477E7E1AF39}" destId="{2B5232CF-8111-4179-B698-288AE4344A91}" srcOrd="3" destOrd="0" parTransId="{7FCA73E5-4ADC-4493-B79B-B2548F992FB2}" sibTransId="{74A78E02-A9D0-4F6F-B953-015557C32742}"/>
+    <dgm:cxn modelId="{6D98208B-CA80-4481-9918-2F47ED3FBFE5}" type="presOf" srcId="{0BDD7853-7695-461C-8B2F-CA5AC439C3D2}" destId="{DA18F163-C48C-4636-B40F-FE6CA799FFAA}" srcOrd="0" destOrd="6" presId="urn:microsoft.com/office/officeart/2011/layout/TabList"/>
+    <dgm:cxn modelId="{B6AB2897-628C-43DA-8858-6F2FF216D259}" srcId="{B7D7A145-1B20-4E3F-965A-D477E7E1AF39}" destId="{0BDD7853-7695-461C-8B2F-CA5AC439C3D2}" srcOrd="7" destOrd="0" parTransId="{CDD6C182-CFA2-41AE-8475-A623D7419FD8}" sibTransId="{DED65B35-C36B-4371-81C3-CEEDF7E0BB08}"/>
+    <dgm:cxn modelId="{E713DBAB-B7A6-44FA-9149-5F73EF482C7D}" type="presOf" srcId="{25829701-67D5-4AD8-9203-976283D7E1CF}" destId="{122C77EF-AD3C-4E18-9EF3-FA9337EAA2D7}" srcOrd="0" destOrd="0" presId="urn:microsoft.com/office/officeart/2011/layout/TabList"/>
+    <dgm:cxn modelId="{17F531BC-5454-4906-95FB-437D14C09CFE}" type="presOf" srcId="{068F869A-EC45-4F2A-9F54-296EAF05C825}" destId="{B284E424-89E7-4A99-B748-4DCE58153750}" srcOrd="0" destOrd="0" presId="urn:microsoft.com/office/officeart/2011/layout/TabList"/>
+    <dgm:cxn modelId="{BC708FC0-72B5-443A-8266-139A350493F2}" srcId="{B7D7A145-1B20-4E3F-965A-D477E7E1AF39}" destId="{101D8288-5B00-4C84-BFDB-D9DCA6A3267C}" srcOrd="1" destOrd="0" parTransId="{4BBE1356-A602-4BAD-924C-B903BB623AF9}" sibTransId="{EF58D793-AAF4-48BB-BA70-D5FC981188E4}"/>
+    <dgm:cxn modelId="{1EF4AAD7-3604-40EA-AA10-11590E42B796}" type="presOf" srcId="{E677D5A6-9ABD-4780-8E71-FC9B38725E77}" destId="{DA18F163-C48C-4636-B40F-FE6CA799FFAA}" srcOrd="0" destOrd="5" presId="urn:microsoft.com/office/officeart/2011/layout/TabList"/>
+    <dgm:cxn modelId="{273660DC-DE6B-4A88-8AFA-F03B1073E0F7}" srcId="{B7D7A145-1B20-4E3F-965A-D477E7E1AF39}" destId="{E677D5A6-9ABD-4780-8E71-FC9B38725E77}" srcOrd="6" destOrd="0" parTransId="{5B8E8DF8-C360-4925-9863-07359607798D}" sibTransId="{492D804A-CCA5-45C2-8C01-E6381591EDA8}"/>
+    <dgm:cxn modelId="{FF330AE9-D902-4D27-B60D-96F972014730}" type="presOf" srcId="{2B5232CF-8111-4179-B698-288AE4344A91}" destId="{DA18F163-C48C-4636-B40F-FE6CA799FFAA}" srcOrd="0" destOrd="2" presId="urn:microsoft.com/office/officeart/2011/layout/TabList"/>
+    <dgm:cxn modelId="{72395CF8-1EF6-42C6-AE08-5AE249166A90}" type="presOf" srcId="{B7D7A145-1B20-4E3F-965A-D477E7E1AF39}" destId="{C55E9AD8-191F-4354-84EF-608074F36243}" srcOrd="0" destOrd="0" presId="urn:microsoft.com/office/officeart/2011/layout/TabList"/>
     <dgm:cxn modelId="{69FE3C15-D075-4169-9759-AD71600745DC}" type="presParOf" srcId="{122C77EF-AD3C-4E18-9EF3-FA9337EAA2D7}" destId="{AFB80B00-26F7-43C5-A674-1E842EFBCFB4}" srcOrd="0" destOrd="0" presId="urn:microsoft.com/office/officeart/2011/layout/TabList"/>
     <dgm:cxn modelId="{D9DC39DD-C5C8-4B21-8235-14E2467C975B}" type="presParOf" srcId="{AFB80B00-26F7-43C5-A674-1E842EFBCFB4}" destId="{B284E424-89E7-4A99-B748-4DCE58153750}" srcOrd="0" destOrd="0" presId="urn:microsoft.com/office/officeart/2011/layout/TabList"/>
     <dgm:cxn modelId="{A7A8D93A-7870-411F-9940-D4A8C0DD356F}" type="presParOf" srcId="{AFB80B00-26F7-43C5-A674-1E842EFBCFB4}" destId="{C55E9AD8-191F-4354-84EF-608074F36243}" srcOrd="1" destOrd="0" presId="urn:microsoft.com/office/officeart/2011/layout/TabList"/>
@@ -2536,7 +2452,7 @@
         </a:bodyPr>
         <a:lstStyle/>
         <a:p>
-          <a:pPr lvl="0" algn="l" defTabSz="1244600">
+          <a:pPr marL="0" lvl="0" indent="0" algn="l" defTabSz="1244600">
             <a:lnSpc>
               <a:spcPct val="90000"/>
             </a:lnSpc>
@@ -2546,16 +2462,14 @@
             <a:spcAft>
               <a:spcPct val="35000"/>
             </a:spcAft>
+            <a:buNone/>
           </a:pPr>
           <a:r>
-            <a:rPr lang="en-US" sz="2800" kern="1200" dirty="0" smtClean="0">
+            <a:rPr lang="en-US" sz="2800" kern="1200" dirty="0">
               <a:latin typeface="Consolas" panose="020B0609020204030204" pitchFamily="49" charset="0"/>
             </a:rPr>
             <a:t>Join or create new game</a:t>
           </a:r>
-          <a:endParaRPr lang="en-US" sz="2800" kern="1200" dirty="0">
-            <a:latin typeface="Consolas" panose="020B0609020204030204" pitchFamily="49" charset="0"/>
-          </a:endParaRPr>
         </a:p>
       </dsp:txBody>
       <dsp:txXfrm>
@@ -2621,7 +2535,7 @@
         </a:bodyPr>
         <a:lstStyle/>
         <a:p>
-          <a:pPr lvl="0" algn="ctr" defTabSz="1644650">
+          <a:pPr marL="0" lvl="0" indent="0" algn="ctr" defTabSz="1644650">
             <a:lnSpc>
               <a:spcPct val="90000"/>
             </a:lnSpc>
@@ -2631,16 +2545,14 @@
             <a:spcAft>
               <a:spcPct val="35000"/>
             </a:spcAft>
+            <a:buNone/>
           </a:pPr>
           <a:r>
-            <a:rPr lang="en-US" sz="3700" b="1" kern="1200" dirty="0" smtClean="0">
+            <a:rPr lang="en-US" sz="3700" b="1" kern="1200" dirty="0">
               <a:latin typeface="Consolas" panose="020B0609020204030204" pitchFamily="49" charset="0"/>
             </a:rPr>
             <a:t>1 vs 1</a:t>
           </a:r>
-          <a:endParaRPr lang="en-US" sz="3700" b="1" kern="1200" dirty="0">
-            <a:latin typeface="Consolas" panose="020B0609020204030204" pitchFamily="49" charset="0"/>
-          </a:endParaRPr>
         </a:p>
       </dsp:txBody>
       <dsp:txXfrm>
@@ -2695,23 +2607,19 @@
             <a:spcAft>
               <a:spcPct val="15000"/>
             </a:spcAft>
-            <a:buChar char="••"/>
+            <a:buChar char="•"/>
           </a:pPr>
           <a:r>
-            <a:rPr lang="en-US" sz="2400" kern="1200" dirty="0" smtClean="0">
+            <a:rPr lang="en-US" sz="2400" kern="1200" dirty="0">
               <a:latin typeface="Consolas" panose="020B0609020204030204" pitchFamily="49" charset="0"/>
             </a:rPr>
             <a:t>Two players                  </a:t>
           </a:r>
-          <a:r>
-            <a:rPr lang="en-US" sz="2400" kern="1200" dirty="0" smtClean="0"/>
-            <a:t/>
-          </a:r>
           <a:br>
-            <a:rPr lang="en-US" sz="2400" kern="1200" dirty="0" smtClean="0"/>
+            <a:rPr lang="en-US" sz="2400" kern="1200" dirty="0"/>
           </a:br>
           <a:r>
-            <a:rPr lang="en-US" sz="2400" kern="1200" dirty="0" smtClean="0">
+            <a:rPr lang="en-US" sz="2400" kern="1200" dirty="0">
               <a:latin typeface="Consolas" panose="020B0609020204030204" pitchFamily="49" charset="0"/>
             </a:rPr>
             <a:t> – one description</a:t>
@@ -2728,23 +2636,19 @@
             <a:spcAft>
               <a:spcPct val="15000"/>
             </a:spcAft>
-            <a:buChar char="••"/>
+            <a:buChar char="•"/>
           </a:pPr>
           <a:r>
-            <a:rPr lang="en-US" sz="2400" kern="1200" dirty="0" smtClean="0">
+            <a:rPr lang="en-US" sz="2400" kern="1200" dirty="0">
               <a:latin typeface="Consolas" panose="020B0609020204030204" pitchFamily="49" charset="0"/>
             </a:rPr>
             <a:t>One description               </a:t>
           </a:r>
-          <a:r>
-            <a:rPr lang="en-US" sz="2400" kern="1200" dirty="0" smtClean="0"/>
-            <a:t/>
-          </a:r>
           <a:br>
-            <a:rPr lang="en-US" sz="2400" kern="1200" dirty="0" smtClean="0"/>
+            <a:rPr lang="en-US" sz="2400" kern="1200" dirty="0"/>
           </a:br>
           <a:r>
-            <a:rPr lang="en-US" sz="2400" kern="1200" dirty="0" smtClean="0">
+            <a:rPr lang="en-US" sz="2400" kern="1200" dirty="0">
               <a:latin typeface="Consolas" panose="020B0609020204030204" pitchFamily="49" charset="0"/>
             </a:rPr>
             <a:t>– two pictures</a:t>
@@ -2761,23 +2665,19 @@
             <a:spcAft>
               <a:spcPct val="15000"/>
             </a:spcAft>
-            <a:buChar char="••"/>
+            <a:buChar char="•"/>
           </a:pPr>
           <a:r>
-            <a:rPr lang="en-US" sz="2400" kern="1200" dirty="0" smtClean="0">
+            <a:rPr lang="en-US" sz="2400" kern="1200" dirty="0">
               <a:latin typeface="Consolas" panose="020B0609020204030204" pitchFamily="49" charset="0"/>
             </a:rPr>
             <a:t>Two pictures</a:t>
           </a:r>
-          <a:r>
-            <a:rPr lang="en-US" sz="2400" kern="1200" dirty="0" smtClean="0"/>
-            <a:t/>
-          </a:r>
           <a:br>
-            <a:rPr lang="en-US" sz="2400" kern="1200" dirty="0" smtClean="0"/>
+            <a:rPr lang="en-US" sz="2400" kern="1200" dirty="0"/>
           </a:br>
           <a:r>
-            <a:rPr lang="en-US" sz="2400" kern="1200" dirty="0" smtClean="0">
+            <a:rPr lang="en-US" sz="2400" kern="1200" dirty="0">
               <a:latin typeface="Consolas" panose="020B0609020204030204" pitchFamily="49" charset="0"/>
             </a:rPr>
             <a:t>- two points of view</a:t>
@@ -2794,10 +2694,10 @@
             <a:spcAft>
               <a:spcPct val="15000"/>
             </a:spcAft>
-            <a:buChar char="••"/>
+            <a:buChar char="•"/>
           </a:pPr>
           <a:r>
-            <a:rPr lang="en-US" sz="2400" kern="1200" dirty="0" smtClean="0">
+            <a:rPr lang="en-US" sz="2400" kern="1200" dirty="0">
               <a:latin typeface="Consolas" panose="020B0609020204030204" pitchFamily="49" charset="0"/>
             </a:rPr>
             <a:t>Two points of view                                     - one winner</a:t>
@@ -2814,13 +2714,13 @@
             <a:spcAft>
               <a:spcPct val="15000"/>
             </a:spcAft>
-            <a:buChar char="••"/>
+            <a:buChar char="•"/>
           </a:pPr>
           <a:r>
-            <a:rPr lang="en-US" sz="2400" kern="1200" dirty="0" smtClean="0">
+            <a:rPr lang="en-US" sz="2400" kern="1200" dirty="0">
               <a:latin typeface="Consolas" panose="020B0609020204030204" pitchFamily="49" charset="0"/>
             </a:rPr>
-            <a:t>One winner                    – everybody happy☺  </a:t>
+            <a:t>One winner                    – everybody - happy☺  </a:t>
           </a:r>
         </a:p>
         <a:p>
@@ -2834,9 +2734,9 @@
             <a:spcAft>
               <a:spcPct val="15000"/>
             </a:spcAft>
-            <a:buChar char="••"/>
+            <a:buChar char="•"/>
           </a:pPr>
-          <a:endParaRPr lang="en-US" sz="2400" kern="1200" dirty="0" smtClean="0">
+          <a:endParaRPr lang="en-US" sz="2400" kern="1200" dirty="0">
             <a:latin typeface="Consolas" panose="020B0609020204030204" pitchFamily="49" charset="0"/>
           </a:endParaRPr>
         </a:p>
@@ -2851,9 +2751,9 @@
             <a:spcAft>
               <a:spcPct val="15000"/>
             </a:spcAft>
-            <a:buChar char="••"/>
+            <a:buChar char="•"/>
           </a:pPr>
-          <a:endParaRPr lang="en-US" sz="2400" kern="1200" dirty="0" smtClean="0">
+          <a:endParaRPr lang="en-US" sz="2400" kern="1200" dirty="0">
             <a:latin typeface="Consolas" panose="020B0609020204030204" pitchFamily="49" charset="0"/>
           </a:endParaRPr>
         </a:p>
@@ -2868,7 +2768,7 @@
             <a:spcAft>
               <a:spcPct val="15000"/>
             </a:spcAft>
-            <a:buChar char="••"/>
+            <a:buChar char="•"/>
           </a:pPr>
           <a:endParaRPr lang="en-US" sz="2400" kern="1200" dirty="0">
             <a:latin typeface="Consolas" panose="020B0609020204030204" pitchFamily="49" charset="0"/>
@@ -2899,7 +2799,7 @@
       </dsp:nvSpPr>
       <dsp:spPr>
         <a:xfrm>
-          <a:off x="317377" y="1284697"/>
+          <a:off x="413379" y="1284697"/>
           <a:ext cx="5204582" cy="0"/>
         </a:xfrm>
         <a:prstGeom prst="line">
@@ -2941,7 +2841,7 @@
       </dsp:nvSpPr>
       <dsp:spPr>
         <a:xfrm>
-          <a:off x="2689974" y="68765"/>
+          <a:off x="2702988" y="68765"/>
           <a:ext cx="2501593" cy="1240051"/>
         </a:xfrm>
         <a:prstGeom prst="rect">
@@ -2971,7 +2871,7 @@
         </a:bodyPr>
         <a:lstStyle/>
         <a:p>
-          <a:pPr lvl="0" algn="ctr" defTabSz="1066800">
+          <a:pPr marL="0" lvl="0" indent="0" algn="ctr" defTabSz="1066800">
             <a:lnSpc>
               <a:spcPct val="90000"/>
             </a:lnSpc>
@@ -2981,20 +2881,18 @@
             <a:spcAft>
               <a:spcPct val="35000"/>
             </a:spcAft>
+            <a:buNone/>
           </a:pPr>
           <a:r>
-            <a:rPr lang="en-US" sz="2400" b="1" kern="1200" dirty="0" smtClean="0">
+            <a:rPr lang="en-US" sz="2400" b="1" kern="1200" dirty="0">
               <a:latin typeface="Consolas" panose="020B0609020204030204" pitchFamily="49" charset="0"/>
             </a:rPr>
             <a:t>Join a tournament every Sunday.</a:t>
           </a:r>
-          <a:endParaRPr lang="en-US" sz="2400" b="1" kern="1200" dirty="0">
-            <a:latin typeface="Consolas" panose="020B0609020204030204" pitchFamily="49" charset="0"/>
-          </a:endParaRPr>
         </a:p>
       </dsp:txBody>
       <dsp:txXfrm>
-        <a:off x="2689974" y="68765"/>
+        <a:off x="2702988" y="68765"/>
         <a:ext cx="2501593" cy="1240051"/>
       </dsp:txXfrm>
     </dsp:sp>
@@ -3005,8 +2903,8 @@
       </dsp:nvSpPr>
       <dsp:spPr>
         <a:xfrm>
-          <a:off x="68498" y="1263"/>
-          <a:ext cx="2622701" cy="1326817"/>
+          <a:off x="-413379" y="0"/>
+          <a:ext cx="3006709" cy="1326817"/>
         </a:xfrm>
         <a:prstGeom prst="round2SameRect">
           <a:avLst>
@@ -3056,7 +2954,7 @@
         </a:bodyPr>
         <a:lstStyle/>
         <a:p>
-          <a:pPr lvl="0" algn="ctr" defTabSz="1644650">
+          <a:pPr marL="0" lvl="0" indent="0" algn="ctr" defTabSz="1644650">
             <a:lnSpc>
               <a:spcPct val="90000"/>
             </a:lnSpc>
@@ -3066,21 +2964,19 @@
             <a:spcAft>
               <a:spcPct val="35000"/>
             </a:spcAft>
+            <a:buNone/>
           </a:pPr>
           <a:r>
-            <a:rPr lang="en-US" sz="3700" b="1" kern="1200" dirty="0" err="1" smtClean="0">
+            <a:rPr lang="en-US" sz="3700" b="1" kern="1200" dirty="0">
               <a:latin typeface="Consolas" panose="020B0609020204030204" pitchFamily="49" charset="0"/>
             </a:rPr>
-            <a:t>Tornament</a:t>
+            <a:t>Tournament</a:t>
           </a:r>
-          <a:endParaRPr lang="en-US" sz="3700" b="1" kern="1200" dirty="0">
-            <a:latin typeface="Consolas" panose="020B0609020204030204" pitchFamily="49" charset="0"/>
-          </a:endParaRPr>
         </a:p>
       </dsp:txBody>
       <dsp:txXfrm>
-        <a:off x="133280" y="66045"/>
-        <a:ext cx="2493137" cy="1262035"/>
+        <a:off x="-348597" y="64782"/>
+        <a:ext cx="2877145" cy="1262035"/>
       </dsp:txXfrm>
     </dsp:sp>
     <dsp:sp modelId="{DA18F163-C48C-4636-B40F-FE6CA799FFAA}">
@@ -3130,7 +3026,7 @@
             <a:spcAft>
               <a:spcPct val="15000"/>
             </a:spcAft>
-            <a:buChar char="••"/>
+            <a:buChar char="•"/>
           </a:pPr>
           <a:endParaRPr lang="en-US" sz="1050" kern="1200" dirty="0">
             <a:latin typeface="Consolas" panose="020B0609020204030204" pitchFamily="49" charset="0"/>
@@ -3147,17 +3043,14 @@
             <a:spcAft>
               <a:spcPts val="600"/>
             </a:spcAft>
-            <a:buChar char="••"/>
+            <a:buChar char="•"/>
           </a:pPr>
           <a:r>
-            <a:rPr lang="en-US" sz="2400" kern="1200" dirty="0" smtClean="0">
+            <a:rPr lang="en-US" sz="2400" kern="1200" dirty="0">
               <a:latin typeface="Consolas" panose="020B0609020204030204" pitchFamily="49" charset="0"/>
             </a:rPr>
             <a:t>4 players                    – 2 rounds</a:t>
           </a:r>
-          <a:endParaRPr lang="en-US" sz="2400" kern="1200" dirty="0">
-            <a:latin typeface="Consolas" panose="020B0609020204030204" pitchFamily="49" charset="0"/>
-          </a:endParaRPr>
         </a:p>
         <a:p>
           <a:pPr marL="228600" lvl="1" indent="-228600" algn="l" defTabSz="1066800">
@@ -3170,17 +3063,14 @@
             <a:spcAft>
               <a:spcPts val="600"/>
             </a:spcAft>
-            <a:buChar char="••"/>
+            <a:buChar char="•"/>
           </a:pPr>
           <a:r>
-            <a:rPr lang="en-US" sz="2400" kern="1200" dirty="0" smtClean="0">
+            <a:rPr lang="en-US" sz="2400" kern="1200" dirty="0">
               <a:latin typeface="Consolas" panose="020B0609020204030204" pitchFamily="49" charset="0"/>
             </a:rPr>
             <a:t>First round                  – one description</a:t>
           </a:r>
-          <a:endParaRPr lang="en-US" sz="2400" kern="1200" dirty="0">
-            <a:latin typeface="Consolas" panose="020B0609020204030204" pitchFamily="49" charset="0"/>
-          </a:endParaRPr>
         </a:p>
         <a:p>
           <a:pPr marL="228600" lvl="1" indent="-228600" algn="l" defTabSz="1066800">
@@ -3193,17 +3083,14 @@
             <a:spcAft>
               <a:spcPts val="600"/>
             </a:spcAft>
-            <a:buChar char="••"/>
+            <a:buChar char="•"/>
           </a:pPr>
           <a:r>
-            <a:rPr lang="en-US" sz="2400" kern="1200" dirty="0" smtClean="0">
+            <a:rPr lang="en-US" sz="2400" kern="1200" dirty="0">
               <a:latin typeface="Consolas" panose="020B0609020204030204" pitchFamily="49" charset="0"/>
             </a:rPr>
             <a:t>Judge – the admin</a:t>
           </a:r>
-          <a:endParaRPr lang="en-US" sz="2400" kern="1200" dirty="0">
-            <a:latin typeface="Consolas" panose="020B0609020204030204" pitchFamily="49" charset="0"/>
-          </a:endParaRPr>
         </a:p>
         <a:p>
           <a:pPr marL="228600" lvl="1" indent="-228600" algn="l" defTabSz="1066800">
@@ -3216,17 +3103,14 @@
             <a:spcAft>
               <a:spcPts val="600"/>
             </a:spcAft>
-            <a:buChar char="••"/>
+            <a:buChar char="•"/>
           </a:pPr>
           <a:r>
-            <a:rPr lang="en-US" sz="2400" kern="1200" dirty="0" smtClean="0">
+            <a:rPr lang="en-US" sz="2400" kern="1200" dirty="0">
               <a:latin typeface="Consolas" panose="020B0609020204030204" pitchFamily="49" charset="0"/>
             </a:rPr>
             <a:t>Second round</a:t>
           </a:r>
-          <a:endParaRPr lang="en-US" sz="2400" kern="1200" dirty="0">
-            <a:latin typeface="Consolas" panose="020B0609020204030204" pitchFamily="49" charset="0"/>
-          </a:endParaRPr>
         </a:p>
         <a:p>
           <a:pPr marL="228600" lvl="1" indent="-228600" algn="l" defTabSz="1066800">
@@ -3239,17 +3123,14 @@
             <a:spcAft>
               <a:spcPts val="600"/>
             </a:spcAft>
-            <a:buChar char="••"/>
+            <a:buChar char="•"/>
           </a:pPr>
           <a:r>
-            <a:rPr lang="en-US" sz="2400" kern="1200" dirty="0" smtClean="0">
+            <a:rPr lang="en-US" sz="2400" kern="1200" dirty="0">
               <a:latin typeface="Consolas" panose="020B0609020204030204" pitchFamily="49" charset="0"/>
             </a:rPr>
             <a:t>– second description </a:t>
           </a:r>
-          <a:endParaRPr lang="en-US" sz="2400" kern="1200" dirty="0">
-            <a:latin typeface="Consolas" panose="020B0609020204030204" pitchFamily="49" charset="0"/>
-          </a:endParaRPr>
         </a:p>
         <a:p>
           <a:pPr marL="228600" lvl="1" indent="-228600" algn="l" defTabSz="1066800">
@@ -3262,17 +3143,14 @@
             <a:spcAft>
               <a:spcPts val="600"/>
             </a:spcAft>
-            <a:buChar char="••"/>
+            <a:buChar char="•"/>
           </a:pPr>
           <a:r>
-            <a:rPr lang="en-US" sz="2400" kern="1200" dirty="0" smtClean="0">
+            <a:rPr lang="en-US" sz="2400" kern="1200" dirty="0">
               <a:latin typeface="Consolas" panose="020B0609020204030204" pitchFamily="49" charset="0"/>
             </a:rPr>
             <a:t>Most important rule:</a:t>
           </a:r>
-          <a:endParaRPr lang="en-US" sz="2400" kern="1200" dirty="0">
-            <a:latin typeface="Consolas" panose="020B0609020204030204" pitchFamily="49" charset="0"/>
-          </a:endParaRPr>
         </a:p>
       </dsp:txBody>
       <dsp:txXfrm>
@@ -6010,7 +5888,7 @@
           </a:lstStyle>
           <a:p>
             <a:r>
-              <a:rPr lang="en-US" smtClean="0"/>
+              <a:rPr lang="en-US"/>
               <a:t>Click to edit Master title style</a:t>
             </a:r>
             <a:endParaRPr lang="en-US" dirty="0"/>
@@ -6075,7 +5953,7 @@
           </a:lstStyle>
           <a:p>
             <a:r>
-              <a:rPr lang="en-US" smtClean="0"/>
+              <a:rPr lang="en-US"/>
               <a:t>Click to edit Master subtitle style</a:t>
             </a:r>
             <a:endParaRPr lang="en-US" dirty="0"/>
@@ -6099,7 +5977,7 @@
           <a:p>
             <a:fld id="{2DC48244-0EE5-4C36-A1AB-4F575C531235}" type="datetimeFigureOut">
               <a:rPr lang="en-US" smtClean="0"/>
-              <a:t>3/25/2017</a:t>
+              <a:t>3/26/2017</a:t>
             </a:fld>
             <a:endParaRPr lang="en-US"/>
           </a:p>
@@ -6193,7 +6071,7 @@
           <a:lstStyle/>
           <a:p>
             <a:r>
-              <a:rPr lang="en-US" smtClean="0"/>
+              <a:rPr lang="en-US"/>
               <a:t>Click to edit Master title style</a:t>
             </a:r>
             <a:endParaRPr lang="en-US" dirty="0"/>
@@ -6217,35 +6095,35 @@
           <a:p>
             <a:pPr lvl="0"/>
             <a:r>
-              <a:rPr lang="en-US" smtClean="0"/>
+              <a:rPr lang="en-US"/>
               <a:t>Click to edit Master text styles</a:t>
             </a:r>
           </a:p>
           <a:p>
             <a:pPr lvl="1"/>
             <a:r>
-              <a:rPr lang="en-US" smtClean="0"/>
+              <a:rPr lang="en-US"/>
               <a:t>Second level</a:t>
             </a:r>
           </a:p>
           <a:p>
             <a:pPr lvl="2"/>
             <a:r>
-              <a:rPr lang="en-US" smtClean="0"/>
+              <a:rPr lang="en-US"/>
               <a:t>Third level</a:t>
             </a:r>
           </a:p>
           <a:p>
             <a:pPr lvl="3"/>
             <a:r>
-              <a:rPr lang="en-US" smtClean="0"/>
+              <a:rPr lang="en-US"/>
               <a:t>Fourth level</a:t>
             </a:r>
           </a:p>
           <a:p>
             <a:pPr lvl="4"/>
             <a:r>
-              <a:rPr lang="en-US" smtClean="0"/>
+              <a:rPr lang="en-US"/>
               <a:t>Fifth level</a:t>
             </a:r>
             <a:endParaRPr lang="en-US" dirty="0"/>
@@ -6269,7 +6147,7 @@
           <a:p>
             <a:fld id="{2DC48244-0EE5-4C36-A1AB-4F575C531235}" type="datetimeFigureOut">
               <a:rPr lang="en-US" smtClean="0"/>
-              <a:t>3/25/2017</a:t>
+              <a:t>3/26/2017</a:t>
             </a:fld>
             <a:endParaRPr lang="en-US"/>
           </a:p>
@@ -6368,7 +6246,7 @@
           <a:lstStyle/>
           <a:p>
             <a:r>
-              <a:rPr lang="en-US" smtClean="0"/>
+              <a:rPr lang="en-US"/>
               <a:t>Click to edit Master title style</a:t>
             </a:r>
             <a:endParaRPr lang="en-US" dirty="0"/>
@@ -6397,35 +6275,35 @@
           <a:p>
             <a:pPr lvl="0"/>
             <a:r>
-              <a:rPr lang="en-US" smtClean="0"/>
+              <a:rPr lang="en-US"/>
               <a:t>Click to edit Master text styles</a:t>
             </a:r>
           </a:p>
           <a:p>
             <a:pPr lvl="1"/>
             <a:r>
-              <a:rPr lang="en-US" smtClean="0"/>
+              <a:rPr lang="en-US"/>
               <a:t>Second level</a:t>
             </a:r>
           </a:p>
           <a:p>
             <a:pPr lvl="2"/>
             <a:r>
-              <a:rPr lang="en-US" smtClean="0"/>
+              <a:rPr lang="en-US"/>
               <a:t>Third level</a:t>
             </a:r>
           </a:p>
           <a:p>
             <a:pPr lvl="3"/>
             <a:r>
-              <a:rPr lang="en-US" smtClean="0"/>
+              <a:rPr lang="en-US"/>
               <a:t>Fourth level</a:t>
             </a:r>
           </a:p>
           <a:p>
             <a:pPr lvl="4"/>
             <a:r>
-              <a:rPr lang="en-US" smtClean="0"/>
+              <a:rPr lang="en-US"/>
               <a:t>Fifth level</a:t>
             </a:r>
             <a:endParaRPr lang="en-US" dirty="0"/>
@@ -6449,7 +6327,7 @@
           <a:p>
             <a:fld id="{2DC48244-0EE5-4C36-A1AB-4F575C531235}" type="datetimeFigureOut">
               <a:rPr lang="en-US" smtClean="0"/>
-              <a:t>3/25/2017</a:t>
+              <a:t>3/26/2017</a:t>
             </a:fld>
             <a:endParaRPr lang="en-US"/>
           </a:p>
@@ -6543,7 +6421,7 @@
           <a:lstStyle/>
           <a:p>
             <a:r>
-              <a:rPr lang="en-US" smtClean="0"/>
+              <a:rPr lang="en-US"/>
               <a:t>Click to edit Master title style</a:t>
             </a:r>
             <a:endParaRPr lang="en-US" dirty="0"/>
@@ -6567,35 +6445,35 @@
           <a:p>
             <a:pPr lvl="0"/>
             <a:r>
-              <a:rPr lang="en-US" smtClean="0"/>
+              <a:rPr lang="en-US"/>
               <a:t>Click to edit Master text styles</a:t>
             </a:r>
           </a:p>
           <a:p>
             <a:pPr lvl="1"/>
             <a:r>
-              <a:rPr lang="en-US" smtClean="0"/>
+              <a:rPr lang="en-US"/>
               <a:t>Second level</a:t>
             </a:r>
           </a:p>
           <a:p>
             <a:pPr lvl="2"/>
             <a:r>
-              <a:rPr lang="en-US" smtClean="0"/>
+              <a:rPr lang="en-US"/>
               <a:t>Third level</a:t>
             </a:r>
           </a:p>
           <a:p>
             <a:pPr lvl="3"/>
             <a:r>
-              <a:rPr lang="en-US" smtClean="0"/>
+              <a:rPr lang="en-US"/>
               <a:t>Fourth level</a:t>
             </a:r>
           </a:p>
           <a:p>
             <a:pPr lvl="4"/>
             <a:r>
-              <a:rPr lang="en-US" smtClean="0"/>
+              <a:rPr lang="en-US"/>
               <a:t>Fifth level</a:t>
             </a:r>
             <a:endParaRPr lang="en-US" dirty="0"/>
@@ -6619,7 +6497,7 @@
           <a:p>
             <a:fld id="{2DC48244-0EE5-4C36-A1AB-4F575C531235}" type="datetimeFigureOut">
               <a:rPr lang="en-US" smtClean="0"/>
-              <a:t>3/25/2017</a:t>
+              <a:t>3/26/2017</a:t>
             </a:fld>
             <a:endParaRPr lang="en-US"/>
           </a:p>
@@ -6722,7 +6600,7 @@
           </a:lstStyle>
           <a:p>
             <a:r>
-              <a:rPr lang="en-US" smtClean="0"/>
+              <a:rPr lang="en-US"/>
               <a:t>Click to edit Master title style</a:t>
             </a:r>
             <a:endParaRPr lang="en-US" dirty="0"/>
@@ -6842,7 +6720,7 @@
           <a:p>
             <a:pPr lvl="0"/>
             <a:r>
-              <a:rPr lang="en-US" smtClean="0"/>
+              <a:rPr lang="en-US"/>
               <a:t>Click to edit Master text styles</a:t>
             </a:r>
           </a:p>
@@ -6865,7 +6743,7 @@
           <a:p>
             <a:fld id="{2DC48244-0EE5-4C36-A1AB-4F575C531235}" type="datetimeFigureOut">
               <a:rPr lang="en-US" smtClean="0"/>
-              <a:t>3/25/2017</a:t>
+              <a:t>3/26/2017</a:t>
             </a:fld>
             <a:endParaRPr lang="en-US"/>
           </a:p>
@@ -6959,7 +6837,7 @@
           <a:lstStyle/>
           <a:p>
             <a:r>
-              <a:rPr lang="en-US" smtClean="0"/>
+              <a:rPr lang="en-US"/>
               <a:t>Click to edit Master title style</a:t>
             </a:r>
             <a:endParaRPr lang="en-US" dirty="0"/>
@@ -6988,35 +6866,35 @@
           <a:p>
             <a:pPr lvl="0"/>
             <a:r>
-              <a:rPr lang="en-US" smtClean="0"/>
+              <a:rPr lang="en-US"/>
               <a:t>Click to edit Master text styles</a:t>
             </a:r>
           </a:p>
           <a:p>
             <a:pPr lvl="1"/>
             <a:r>
-              <a:rPr lang="en-US" smtClean="0"/>
+              <a:rPr lang="en-US"/>
               <a:t>Second level</a:t>
             </a:r>
           </a:p>
           <a:p>
             <a:pPr lvl="2"/>
             <a:r>
-              <a:rPr lang="en-US" smtClean="0"/>
+              <a:rPr lang="en-US"/>
               <a:t>Third level</a:t>
             </a:r>
           </a:p>
           <a:p>
             <a:pPr lvl="3"/>
             <a:r>
-              <a:rPr lang="en-US" smtClean="0"/>
+              <a:rPr lang="en-US"/>
               <a:t>Fourth level</a:t>
             </a:r>
           </a:p>
           <a:p>
             <a:pPr lvl="4"/>
             <a:r>
-              <a:rPr lang="en-US" smtClean="0"/>
+              <a:rPr lang="en-US"/>
               <a:t>Fifth level</a:t>
             </a:r>
             <a:endParaRPr lang="en-US" dirty="0"/>
@@ -7045,35 +6923,35 @@
           <a:p>
             <a:pPr lvl="0"/>
             <a:r>
-              <a:rPr lang="en-US" smtClean="0"/>
+              <a:rPr lang="en-US"/>
               <a:t>Click to edit Master text styles</a:t>
             </a:r>
           </a:p>
           <a:p>
             <a:pPr lvl="1"/>
             <a:r>
-              <a:rPr lang="en-US" smtClean="0"/>
+              <a:rPr lang="en-US"/>
               <a:t>Second level</a:t>
             </a:r>
           </a:p>
           <a:p>
             <a:pPr lvl="2"/>
             <a:r>
-              <a:rPr lang="en-US" smtClean="0"/>
+              <a:rPr lang="en-US"/>
               <a:t>Third level</a:t>
             </a:r>
           </a:p>
           <a:p>
             <a:pPr lvl="3"/>
             <a:r>
-              <a:rPr lang="en-US" smtClean="0"/>
+              <a:rPr lang="en-US"/>
               <a:t>Fourth level</a:t>
             </a:r>
           </a:p>
           <a:p>
             <a:pPr lvl="4"/>
             <a:r>
-              <a:rPr lang="en-US" smtClean="0"/>
+              <a:rPr lang="en-US"/>
               <a:t>Fifth level</a:t>
             </a:r>
             <a:endParaRPr lang="en-US" dirty="0"/>
@@ -7097,7 +6975,7 @@
           <a:p>
             <a:fld id="{2DC48244-0EE5-4C36-A1AB-4F575C531235}" type="datetimeFigureOut">
               <a:rPr lang="en-US" smtClean="0"/>
-              <a:t>3/25/2017</a:t>
+              <a:t>3/26/2017</a:t>
             </a:fld>
             <a:endParaRPr lang="en-US"/>
           </a:p>
@@ -7196,7 +7074,7 @@
           <a:lstStyle/>
           <a:p>
             <a:r>
-              <a:rPr lang="en-US" smtClean="0"/>
+              <a:rPr lang="en-US"/>
               <a:t>Click to edit Master title style</a:t>
             </a:r>
             <a:endParaRPr lang="en-US" dirty="0"/>
@@ -7262,7 +7140,7 @@
           <a:p>
             <a:pPr lvl="0"/>
             <a:r>
-              <a:rPr lang="en-US" smtClean="0"/>
+              <a:rPr lang="en-US"/>
               <a:t>Click to edit Master text styles</a:t>
             </a:r>
           </a:p>
@@ -7290,35 +7168,35 @@
           <a:p>
             <a:pPr lvl="0"/>
             <a:r>
-              <a:rPr lang="en-US" smtClean="0"/>
+              <a:rPr lang="en-US"/>
               <a:t>Click to edit Master text styles</a:t>
             </a:r>
           </a:p>
           <a:p>
             <a:pPr lvl="1"/>
             <a:r>
-              <a:rPr lang="en-US" smtClean="0"/>
+              <a:rPr lang="en-US"/>
               <a:t>Second level</a:t>
             </a:r>
           </a:p>
           <a:p>
             <a:pPr lvl="2"/>
             <a:r>
-              <a:rPr lang="en-US" smtClean="0"/>
+              <a:rPr lang="en-US"/>
               <a:t>Third level</a:t>
             </a:r>
           </a:p>
           <a:p>
             <a:pPr lvl="3"/>
             <a:r>
-              <a:rPr lang="en-US" smtClean="0"/>
+              <a:rPr lang="en-US"/>
               <a:t>Fourth level</a:t>
             </a:r>
           </a:p>
           <a:p>
             <a:pPr lvl="4"/>
             <a:r>
-              <a:rPr lang="en-US" smtClean="0"/>
+              <a:rPr lang="en-US"/>
               <a:t>Fifth level</a:t>
             </a:r>
             <a:endParaRPr lang="en-US" dirty="0"/>
@@ -7384,7 +7262,7 @@
           <a:p>
             <a:pPr lvl="0"/>
             <a:r>
-              <a:rPr lang="en-US" smtClean="0"/>
+              <a:rPr lang="en-US"/>
               <a:t>Click to edit Master text styles</a:t>
             </a:r>
           </a:p>
@@ -7412,35 +7290,35 @@
           <a:p>
             <a:pPr lvl="0"/>
             <a:r>
-              <a:rPr lang="en-US" smtClean="0"/>
+              <a:rPr lang="en-US"/>
               <a:t>Click to edit Master text styles</a:t>
             </a:r>
           </a:p>
           <a:p>
             <a:pPr lvl="1"/>
             <a:r>
-              <a:rPr lang="en-US" smtClean="0"/>
+              <a:rPr lang="en-US"/>
               <a:t>Second level</a:t>
             </a:r>
           </a:p>
           <a:p>
             <a:pPr lvl="2"/>
             <a:r>
-              <a:rPr lang="en-US" smtClean="0"/>
+              <a:rPr lang="en-US"/>
               <a:t>Third level</a:t>
             </a:r>
           </a:p>
           <a:p>
             <a:pPr lvl="3"/>
             <a:r>
-              <a:rPr lang="en-US" smtClean="0"/>
+              <a:rPr lang="en-US"/>
               <a:t>Fourth level</a:t>
             </a:r>
           </a:p>
           <a:p>
             <a:pPr lvl="4"/>
             <a:r>
-              <a:rPr lang="en-US" smtClean="0"/>
+              <a:rPr lang="en-US"/>
               <a:t>Fifth level</a:t>
             </a:r>
             <a:endParaRPr lang="en-US" dirty="0"/>
@@ -7464,7 +7342,7 @@
           <a:p>
             <a:fld id="{2DC48244-0EE5-4C36-A1AB-4F575C531235}" type="datetimeFigureOut">
               <a:rPr lang="en-US" smtClean="0"/>
-              <a:t>3/25/2017</a:t>
+              <a:t>3/26/2017</a:t>
             </a:fld>
             <a:endParaRPr lang="en-US"/>
           </a:p>
@@ -7558,7 +7436,7 @@
           <a:lstStyle/>
           <a:p>
             <a:r>
-              <a:rPr lang="en-US" smtClean="0"/>
+              <a:rPr lang="en-US"/>
               <a:t>Click to edit Master title style</a:t>
             </a:r>
             <a:endParaRPr lang="en-US" dirty="0"/>
@@ -7582,7 +7460,7 @@
           <a:p>
             <a:fld id="{2DC48244-0EE5-4C36-A1AB-4F575C531235}" type="datetimeFigureOut">
               <a:rPr lang="en-US" smtClean="0"/>
-              <a:t>3/25/2017</a:t>
+              <a:t>3/26/2017</a:t>
             </a:fld>
             <a:endParaRPr lang="en-US"/>
           </a:p>
@@ -7677,7 +7555,7 @@
           <a:p>
             <a:fld id="{2DC48244-0EE5-4C36-A1AB-4F575C531235}" type="datetimeFigureOut">
               <a:rPr lang="en-US" smtClean="0"/>
-              <a:t>3/25/2017</a:t>
+              <a:t>3/26/2017</a:t>
             </a:fld>
             <a:endParaRPr lang="en-US"/>
           </a:p>
@@ -7780,7 +7658,7 @@
           </a:lstStyle>
           <a:p>
             <a:r>
-              <a:rPr lang="en-US" smtClean="0"/>
+              <a:rPr lang="en-US"/>
               <a:t>Click to edit Master title style</a:t>
             </a:r>
             <a:endParaRPr lang="en-US" dirty="0"/>
@@ -7837,35 +7715,35 @@
           <a:p>
             <a:pPr lvl="0"/>
             <a:r>
-              <a:rPr lang="en-US" smtClean="0"/>
+              <a:rPr lang="en-US"/>
               <a:t>Click to edit Master text styles</a:t>
             </a:r>
           </a:p>
           <a:p>
             <a:pPr lvl="1"/>
             <a:r>
-              <a:rPr lang="en-US" smtClean="0"/>
+              <a:rPr lang="en-US"/>
               <a:t>Second level</a:t>
             </a:r>
           </a:p>
           <a:p>
             <a:pPr lvl="2"/>
             <a:r>
-              <a:rPr lang="en-US" smtClean="0"/>
+              <a:rPr lang="en-US"/>
               <a:t>Third level</a:t>
             </a:r>
           </a:p>
           <a:p>
             <a:pPr lvl="3"/>
             <a:r>
-              <a:rPr lang="en-US" smtClean="0"/>
+              <a:rPr lang="en-US"/>
               <a:t>Fourth level</a:t>
             </a:r>
           </a:p>
           <a:p>
             <a:pPr lvl="4"/>
             <a:r>
-              <a:rPr lang="en-US" smtClean="0"/>
+              <a:rPr lang="en-US"/>
               <a:t>Fifth level</a:t>
             </a:r>
             <a:endParaRPr lang="en-US" dirty="0"/>
@@ -7931,7 +7809,7 @@
           <a:p>
             <a:pPr lvl="0"/>
             <a:r>
-              <a:rPr lang="en-US" smtClean="0"/>
+              <a:rPr lang="en-US"/>
               <a:t>Click to edit Master text styles</a:t>
             </a:r>
           </a:p>
@@ -7954,7 +7832,7 @@
           <a:p>
             <a:fld id="{2DC48244-0EE5-4C36-A1AB-4F575C531235}" type="datetimeFigureOut">
               <a:rPr lang="en-US" smtClean="0"/>
-              <a:t>3/25/2017</a:t>
+              <a:t>3/26/2017</a:t>
             </a:fld>
             <a:endParaRPr lang="en-US"/>
           </a:p>
@@ -8057,7 +7935,7 @@
           </a:lstStyle>
           <a:p>
             <a:r>
-              <a:rPr lang="en-US" smtClean="0"/>
+              <a:rPr lang="en-US"/>
               <a:t>Click to edit Master title style</a:t>
             </a:r>
             <a:endParaRPr lang="en-US" dirty="0"/>
@@ -8122,7 +8000,7 @@
           </a:lstStyle>
           <a:p>
             <a:r>
-              <a:rPr lang="en-US" smtClean="0"/>
+              <a:rPr lang="en-US"/>
               <a:t>Click icon to add picture</a:t>
             </a:r>
             <a:endParaRPr lang="en-US" dirty="0"/>
@@ -8188,7 +8066,7 @@
           <a:p>
             <a:pPr lvl="0"/>
             <a:r>
-              <a:rPr lang="en-US" smtClean="0"/>
+              <a:rPr lang="en-US"/>
               <a:t>Click to edit Master text styles</a:t>
             </a:r>
           </a:p>
@@ -8211,7 +8089,7 @@
           <a:p>
             <a:fld id="{2DC48244-0EE5-4C36-A1AB-4F575C531235}" type="datetimeFigureOut">
               <a:rPr lang="en-US" smtClean="0"/>
-              <a:t>3/25/2017</a:t>
+              <a:t>3/26/2017</a:t>
             </a:fld>
             <a:endParaRPr lang="en-US"/>
           </a:p>
@@ -8320,7 +8198,7 @@
           <a:lstStyle/>
           <a:p>
             <a:r>
-              <a:rPr lang="en-US" smtClean="0"/>
+              <a:rPr lang="en-US"/>
               <a:t>Click to edit Master title style</a:t>
             </a:r>
             <a:endParaRPr lang="en-US" dirty="0"/>
@@ -8354,35 +8232,35 @@
           <a:p>
             <a:pPr lvl="0"/>
             <a:r>
-              <a:rPr lang="en-US" smtClean="0"/>
+              <a:rPr lang="en-US"/>
               <a:t>Click to edit Master text styles</a:t>
             </a:r>
           </a:p>
           <a:p>
             <a:pPr lvl="1"/>
             <a:r>
-              <a:rPr lang="en-US" smtClean="0"/>
+              <a:rPr lang="en-US"/>
               <a:t>Second level</a:t>
             </a:r>
           </a:p>
           <a:p>
             <a:pPr lvl="2"/>
             <a:r>
-              <a:rPr lang="en-US" smtClean="0"/>
+              <a:rPr lang="en-US"/>
               <a:t>Third level</a:t>
             </a:r>
           </a:p>
           <a:p>
             <a:pPr lvl="3"/>
             <a:r>
-              <a:rPr lang="en-US" smtClean="0"/>
+              <a:rPr lang="en-US"/>
               <a:t>Fourth level</a:t>
             </a:r>
           </a:p>
           <a:p>
             <a:pPr lvl="4"/>
             <a:r>
-              <a:rPr lang="en-US" smtClean="0"/>
+              <a:rPr lang="en-US"/>
               <a:t>Fifth level</a:t>
             </a:r>
             <a:endParaRPr lang="en-US" dirty="0"/>
@@ -8424,7 +8302,7 @@
           <a:p>
             <a:fld id="{2DC48244-0EE5-4C36-A1AB-4F575C531235}" type="datetimeFigureOut">
               <a:rPr lang="en-US" smtClean="0"/>
-              <a:t>3/25/2017</a:t>
+              <a:t>3/26/2017</a:t>
             </a:fld>
             <a:endParaRPr lang="en-US"/>
           </a:p>
@@ -8847,14 +8725,11 @@
           <a:lstStyle/>
           <a:p>
             <a:r>
-              <a:rPr lang="en-US" sz="9600" dirty="0" smtClean="0">
+              <a:rPr lang="en-US" sz="9600" dirty="0">
                 <a:latin typeface="Consolas" panose="020B0609020204030204" pitchFamily="49" charset="0"/>
               </a:rPr>
               <a:t>Pixel Wars</a:t>
             </a:r>
-            <a:endParaRPr lang="en-US" sz="9600" dirty="0">
-              <a:latin typeface="Consolas" panose="020B0609020204030204" pitchFamily="49" charset="0"/>
-            </a:endParaRPr>
           </a:p>
         </p:txBody>
       </p:sp>
@@ -8874,14 +8749,11 @@
           <a:lstStyle/>
           <a:p>
             <a:r>
-              <a:rPr lang="en-US" dirty="0" smtClean="0">
+              <a:rPr lang="en-US" dirty="0">
                 <a:latin typeface="Consolas" panose="020B0609020204030204" pitchFamily="49" charset="0"/>
               </a:rPr>
-              <a:t>Made by pixel warriors team</a:t>
+              <a:t>Made by pixel art warrior</a:t>
             </a:r>
-            <a:endParaRPr lang="en-US" dirty="0">
-              <a:latin typeface="Consolas" panose="020B0609020204030204" pitchFamily="49" charset="0"/>
-            </a:endParaRPr>
           </a:p>
         </p:txBody>
       </p:sp>
@@ -8949,25 +8821,18 @@
   <p:clrMapOvr>
     <a:masterClrMapping/>
   </p:clrMapOvr>
-  <mc:AlternateContent xmlns:mc="http://schemas.openxmlformats.org/markup-compatibility/2006">
-    <mc:Choice xmlns:p14="http://schemas.microsoft.com/office/powerpoint/2010/main" Requires="p14">
+  <mc:AlternateContent xmlns:mc="http://schemas.openxmlformats.org/markup-compatibility/2006" xmlns:p14="http://schemas.microsoft.com/office/powerpoint/2010/main">
+    <mc:Choice Requires="p14">
       <p:transition spd="med" p14:dur="700">
         <p:fade/>
       </p:transition>
     </mc:Choice>
-    <mc:Fallback>
+    <mc:Fallback xmlns="">
       <p:transition spd="med">
         <p:fade/>
       </p:transition>
     </mc:Fallback>
   </mc:AlternateContent>
-  <p:timing>
-    <p:tnLst>
-      <p:par>
-        <p:cTn id="1" dur="indefinite" restart="never" nodeType="tmRoot"/>
-      </p:par>
-    </p:tnLst>
-  </p:timing>
 </p:sld>
 </file>
 
@@ -9009,14 +8874,11 @@
           <a:lstStyle/>
           <a:p>
             <a:r>
-              <a:rPr lang="en-US" dirty="0" smtClean="0">
+              <a:rPr lang="en-US" dirty="0">
                 <a:latin typeface="Consolas" panose="020B0609020204030204" pitchFamily="49" charset="0"/>
               </a:rPr>
               <a:t>Description:</a:t>
             </a:r>
-            <a:endParaRPr lang="en-US" dirty="0">
-              <a:latin typeface="Consolas" panose="020B0609020204030204" pitchFamily="49" charset="0"/>
-            </a:endParaRPr>
           </a:p>
         </p:txBody>
       </p:sp>
@@ -9041,48 +8903,33 @@
           <a:lstStyle/>
           <a:p>
             <a:r>
-              <a:rPr lang="en-US" dirty="0" smtClean="0"/>
+              <a:rPr lang="en-US" dirty="0"/>
               <a:t>Multiplayer game</a:t>
             </a:r>
-            <a:endParaRPr lang="en-US" dirty="0"/>
           </a:p>
           <a:p>
             <a:r>
               <a:rPr lang="en-US" dirty="0"/>
-              <a:t>C</a:t>
+              <a:t>Challenge people to see who is a  better artist</a:t>
             </a:r>
+          </a:p>
+          <a:p>
             <a:r>
-              <a:rPr lang="en-US" dirty="0" smtClean="0"/>
-              <a:t>hallenge people </a:t>
-            </a:r>
-            <a:r>
-              <a:rPr lang="en-US" dirty="0" smtClean="0"/>
-              <a:t>to see who </a:t>
-            </a:r>
-            <a:r>
-              <a:rPr lang="en-US" dirty="0" smtClean="0"/>
-              <a:t>is a  better artist</a:t>
-            </a:r>
-            <a:endParaRPr lang="en-US" dirty="0" smtClean="0"/>
-          </a:p>
-          <a:p>
-            <a:r>
-              <a:rPr lang="en-US" dirty="0" smtClean="0"/>
+              <a:rPr lang="en-US" dirty="0"/>
               <a:t>Improve your artistic abilities</a:t>
             </a:r>
           </a:p>
           <a:p>
             <a:r>
-              <a:rPr lang="en-US" dirty="0" smtClean="0"/>
+              <a:rPr lang="en-US" dirty="0"/>
               <a:t>Have fun beating others</a:t>
             </a:r>
           </a:p>
           <a:p>
             <a:r>
-              <a:rPr lang="en-US" dirty="0" smtClean="0"/>
+              <a:rPr lang="en-US" dirty="0"/>
               <a:t>ENJOY!!  </a:t>
             </a:r>
-            <a:endParaRPr lang="en-US" dirty="0" smtClean="0"/>
           </a:p>
         </p:txBody>
       </p:sp>
@@ -9222,25 +9069,18 @@
   <p:clrMapOvr>
     <a:masterClrMapping/>
   </p:clrMapOvr>
-  <mc:AlternateContent xmlns:mc="http://schemas.openxmlformats.org/markup-compatibility/2006">
-    <mc:Choice xmlns:p14="http://schemas.microsoft.com/office/powerpoint/2010/main" Requires="p14">
+  <mc:AlternateContent xmlns:mc="http://schemas.openxmlformats.org/markup-compatibility/2006" xmlns:p14="http://schemas.microsoft.com/office/powerpoint/2010/main">
+    <mc:Choice Requires="p14">
       <p:transition spd="slow" p14:dur="4000">
         <p14:vortex dir="r"/>
       </p:transition>
     </mc:Choice>
-    <mc:Fallback>
+    <mc:Fallback xmlns="">
       <p:transition spd="slow">
         <p:fade/>
       </p:transition>
     </mc:Fallback>
   </mc:AlternateContent>
-  <p:timing>
-    <p:tnLst>
-      <p:par>
-        <p:cTn id="1" dur="indefinite" restart="never" nodeType="tmRoot"/>
-      </p:par>
-    </p:tnLst>
-  </p:timing>
 </p:sld>
 </file>
 
@@ -9282,19 +9122,13 @@
           <a:lstStyle/>
           <a:p>
             <a:r>
-              <a:rPr lang="en-US" dirty="0" smtClean="0">
+              <a:rPr lang="en-US" dirty="0">
                 <a:latin typeface="Consolas" panose="020B0609020204030204" pitchFamily="49" charset="0"/>
               </a:rPr>
-              <a:t>Why did we </a:t>
+              <a:t>Why did we choose that idea</a:t>
             </a:r>
             <a:r>
-              <a:rPr lang="en-US" dirty="0" smtClean="0">
-                <a:latin typeface="Consolas" panose="020B0609020204030204" pitchFamily="49" charset="0"/>
-              </a:rPr>
-              <a:t>choose that idea</a:t>
-            </a:r>
-            <a:r>
-              <a:rPr lang="bg-BG" dirty="0" smtClean="0">
+              <a:rPr lang="bg-BG" dirty="0">
                 <a:latin typeface="Consolas" panose="020B0609020204030204" pitchFamily="49" charset="0"/>
               </a:rPr>
               <a:t>?</a:t>
@@ -9407,13 +9241,6 @@
   <p:transition spd="slow">
     <p:randomBar dir="vert"/>
   </p:transition>
-  <p:timing>
-    <p:tnLst>
-      <p:par>
-        <p:cTn id="1" dur="indefinite" restart="never" nodeType="tmRoot"/>
-      </p:par>
-    </p:tnLst>
-  </p:timing>
 </p:sld>
 </file>
 
@@ -9455,14 +9282,11 @@
           <a:lstStyle/>
           <a:p>
             <a:r>
-              <a:rPr lang="en-US" dirty="0" smtClean="0">
+              <a:rPr lang="en-US" dirty="0">
                 <a:latin typeface="Consolas" panose="020B0609020204030204" pitchFamily="49" charset="0"/>
               </a:rPr>
               <a:t>What did we use?</a:t>
             </a:r>
-            <a:endParaRPr lang="en-US" dirty="0">
-              <a:latin typeface="Consolas" panose="020B0609020204030204" pitchFamily="49" charset="0"/>
-            </a:endParaRPr>
           </a:p>
         </p:txBody>
       </p:sp>
@@ -9644,25 +9468,18 @@
   <p:clrMapOvr>
     <a:masterClrMapping/>
   </p:clrMapOvr>
-  <mc:AlternateContent xmlns:mc="http://schemas.openxmlformats.org/markup-compatibility/2006">
-    <mc:Choice xmlns:p14="http://schemas.microsoft.com/office/powerpoint/2010/main" Requires="p14">
+  <mc:AlternateContent xmlns:mc="http://schemas.openxmlformats.org/markup-compatibility/2006" xmlns:p14="http://schemas.microsoft.com/office/powerpoint/2010/main">
+    <mc:Choice Requires="p14">
       <p:transition spd="slow" p14:dur="1500">
         <p:split orient="vert"/>
       </p:transition>
     </mc:Choice>
-    <mc:Fallback>
+    <mc:Fallback xmlns="">
       <p:transition spd="slow">
         <p:split orient="vert"/>
       </p:transition>
     </mc:Fallback>
   </mc:AlternateContent>
-  <p:timing>
-    <p:tnLst>
-      <p:par>
-        <p:cTn id="1" dur="indefinite" restart="never" nodeType="tmRoot"/>
-      </p:par>
-    </p:tnLst>
-  </p:timing>
 </p:sld>
 </file>
 
@@ -9785,7 +9602,7 @@
           </a:lstStyle>
           <a:p>
             <a:r>
-              <a:rPr lang="en-US" smtClean="0">
+              <a:rPr lang="en-US">
                 <a:latin typeface="Consolas" panose="020B0609020204030204" pitchFamily="49" charset="0"/>
               </a:rPr>
               <a:t>Rules</a:t>
@@ -9829,7 +9646,7 @@
           <p:nvPr>
             <p:extLst>
               <p:ext uri="{D42A27DB-BD31-4B8C-83A1-F6EECF244321}">
-                <p14:modId xmlns:p14="http://schemas.microsoft.com/office/powerpoint/2010/main" val="1554810349"/>
+                <p14:modId xmlns:p14="http://schemas.microsoft.com/office/powerpoint/2010/main" val="378464649"/>
               </p:ext>
             </p:extLst>
           </p:nvPr>
@@ -9854,25 +9671,18 @@
   <p:clrMapOvr>
     <a:masterClrMapping/>
   </p:clrMapOvr>
-  <mc:AlternateContent xmlns:mc="http://schemas.openxmlformats.org/markup-compatibility/2006">
-    <mc:Choice xmlns:p14="http://schemas.microsoft.com/office/powerpoint/2010/main" Requires="p14">
+  <mc:AlternateContent xmlns:mc="http://schemas.openxmlformats.org/markup-compatibility/2006" xmlns:p14="http://schemas.microsoft.com/office/powerpoint/2010/main">
+    <mc:Choice Requires="p14">
       <p:transition spd="slow" p14:dur="800">
         <p:circle/>
       </p:transition>
     </mc:Choice>
-    <mc:Fallback>
+    <mc:Fallback xmlns="">
       <p:transition spd="slow">
         <p:circle/>
       </p:transition>
     </mc:Fallback>
   </mc:AlternateContent>
-  <p:timing>
-    <p:tnLst>
-      <p:par>
-        <p:cTn id="1" dur="indefinite" restart="never" nodeType="tmRoot"/>
-      </p:par>
-    </p:tnLst>
-  </p:timing>
 </p:sld>
 </file>
 
@@ -9914,14 +9724,11 @@
           <a:lstStyle/>
           <a:p>
             <a:r>
-              <a:rPr lang="en-US" dirty="0" smtClean="0">
+              <a:rPr lang="en-US" dirty="0">
                 <a:latin typeface="Consolas" panose="020B0609020204030204" pitchFamily="49" charset="0"/>
               </a:rPr>
               <a:t>Rules</a:t>
             </a:r>
-            <a:endParaRPr lang="en-US" dirty="0">
-              <a:latin typeface="Consolas" panose="020B0609020204030204" pitchFamily="49" charset="0"/>
-            </a:endParaRPr>
           </a:p>
         </p:txBody>
       </p:sp>
@@ -9935,7 +9742,7 @@
             <p:ph idx="1"/>
             <p:extLst>
               <p:ext uri="{D42A27DB-BD31-4B8C-83A1-F6EECF244321}">
-                <p14:modId xmlns:p14="http://schemas.microsoft.com/office/powerpoint/2010/main" val="588492417"/>
+                <p14:modId xmlns:p14="http://schemas.microsoft.com/office/powerpoint/2010/main" val="2856024532"/>
               </p:ext>
             </p:extLst>
           </p:nvPr>
@@ -10086,13 +9893,13 @@
   <p:clrMapOvr>
     <a:masterClrMapping/>
   </p:clrMapOvr>
-  <mc:AlternateContent xmlns:mc="http://schemas.openxmlformats.org/markup-compatibility/2006">
-    <mc:Choice xmlns:p14="http://schemas.microsoft.com/office/powerpoint/2010/main" Requires="p14">
+  <mc:AlternateContent xmlns:mc="http://schemas.openxmlformats.org/markup-compatibility/2006" xmlns:p14="http://schemas.microsoft.com/office/powerpoint/2010/main">
+    <mc:Choice Requires="p14">
       <p:transition spd="slow" p14:dur="800">
         <p:circle/>
       </p:transition>
     </mc:Choice>
-    <mc:Fallback>
+    <mc:Fallback xmlns="">
       <p:transition spd="slow">
         <p:circle/>
       </p:transition>
@@ -10279,7 +10086,18 @@
               <a:rPr lang="en-US" dirty="0">
                 <a:latin typeface="Consolas" panose="020B0609020204030204" pitchFamily="49" charset="0"/>
               </a:rPr>
-              <a:t>(){//</a:t>
+              <a:t>(){</a:t>
+            </a:r>
+          </a:p>
+          <a:p>
+            <a:pPr marL="0" indent="0">
+              <a:buNone/>
+            </a:pPr>
+            <a:r>
+              <a:rPr lang="en-US" dirty="0">
+                <a:latin typeface="Consolas" panose="020B0609020204030204" pitchFamily="49" charset="0"/>
+              </a:rPr>
+              <a:t>	//</a:t>
             </a:r>
             <a:r>
               <a:rPr lang="en-US" b="1" i="1" u="sng" dirty="0">
@@ -10305,25 +10123,13 @@
               <a:t>	string </a:t>
             </a:r>
             <a:r>
-              <a:rPr lang="en-US" b="1" i="1" u="sng" dirty="0" err="1">
+              <a:rPr lang="en-US" b="1" i="1" dirty="0" err="1">
                 <a:latin typeface="Consolas" panose="020B0609020204030204" pitchFamily="49" charset="0"/>
               </a:rPr>
-              <a:t>Aneta</a:t>
+              <a:t>Aneta_Tsvetkova</a:t>
             </a:r>
             <a:r>
-              <a:rPr lang="en-US" i="1" u="sng" dirty="0">
-                <a:latin typeface="Consolas" panose="020B0609020204030204" pitchFamily="49" charset="0"/>
-              </a:rPr>
-              <a:t> </a:t>
-            </a:r>
-            <a:r>
-              <a:rPr lang="en-US" b="1" i="1" u="sng" dirty="0" err="1">
-                <a:latin typeface="Consolas" panose="020B0609020204030204" pitchFamily="49" charset="0"/>
-              </a:rPr>
-              <a:t>Tsvetkova</a:t>
-            </a:r>
-            <a:r>
-              <a:rPr lang="en-US" i="1" u="sng" dirty="0">
+              <a:rPr lang="en-US" i="1" dirty="0">
                 <a:latin typeface="Consolas" panose="020B0609020204030204" pitchFamily="49" charset="0"/>
               </a:rPr>
               <a:t> </a:t>
@@ -10332,7 +10138,7 @@
               <a:rPr lang="en-US" dirty="0">
                 <a:latin typeface="Consolas" panose="020B0609020204030204" pitchFamily="49" charset="0"/>
               </a:rPr>
-              <a:t>= “programmer1”;</a:t>
+              <a:t>= “programmer0”;</a:t>
             </a:r>
           </a:p>
           <a:p>
@@ -10346,25 +10152,77 @@
               <a:t>	string </a:t>
             </a:r>
             <a:r>
-              <a:rPr lang="en-US" b="1" i="1" u="sng" dirty="0">
+              <a:rPr lang="en-US" b="1" i="1" dirty="0" err="1">
                 <a:latin typeface="Consolas" panose="020B0609020204030204" pitchFamily="49" charset="0"/>
               </a:rPr>
-              <a:t>Evgeni</a:t>
+              <a:t>Evgeni_Dimov</a:t>
             </a:r>
             <a:r>
-              <a:rPr lang="en-US" i="1" u="sng" dirty="0">
+              <a:rPr lang="en-US" i="1" dirty="0">
                 <a:latin typeface="Consolas" panose="020B0609020204030204" pitchFamily="49" charset="0"/>
               </a:rPr>
-              <a:t> </a:t>
+              <a:t>    </a:t>
             </a:r>
             <a:r>
-              <a:rPr lang="en-US" b="1" i="1" u="sng" dirty="0" err="1">
+              <a:rPr lang="en-US" dirty="0">
                 <a:latin typeface="Consolas" panose="020B0609020204030204" pitchFamily="49" charset="0"/>
               </a:rPr>
-              <a:t>Dimov</a:t>
+              <a:t>= “</a:t>
             </a:r>
             <a:r>
-              <a:rPr lang="en-US" i="1" u="sng" dirty="0">
+              <a:rPr lang="en-US" dirty="0" err="1">
+                <a:latin typeface="Consolas" panose="020B0609020204030204" pitchFamily="49" charset="0"/>
+              </a:rPr>
+              <a:t>programator</a:t>
+            </a:r>
+            <a:r>
+              <a:rPr lang="en-US" dirty="0">
+                <a:latin typeface="Consolas" panose="020B0609020204030204" pitchFamily="49" charset="0"/>
+              </a:rPr>
+              <a:t>”;</a:t>
+            </a:r>
+          </a:p>
+          <a:p>
+            <a:pPr marL="0" indent="0">
+              <a:buNone/>
+            </a:pPr>
+            <a:r>
+              <a:rPr lang="en-US" dirty="0">
+                <a:latin typeface="Consolas" panose="020B0609020204030204" pitchFamily="49" charset="0"/>
+              </a:rPr>
+              <a:t>	string </a:t>
+            </a:r>
+            <a:r>
+              <a:rPr lang="en-US" b="1" i="1" dirty="0" err="1">
+                <a:latin typeface="Consolas" panose="020B0609020204030204" pitchFamily="49" charset="0"/>
+              </a:rPr>
+              <a:t>Nikola_Pavlovski</a:t>
+            </a:r>
+            <a:r>
+              <a:rPr lang="en-US" dirty="0">
+                <a:latin typeface="Consolas" panose="020B0609020204030204" pitchFamily="49" charset="0"/>
+              </a:rPr>
+              <a:t>= “programmer1”;</a:t>
+            </a:r>
+          </a:p>
+          <a:p>
+            <a:pPr marL="0" indent="0">
+              <a:buNone/>
+            </a:pPr>
+            <a:r>
+              <a:rPr lang="en-US" dirty="0">
+                <a:latin typeface="Consolas" panose="020B0609020204030204" pitchFamily="49" charset="0"/>
+              </a:rPr>
+              <a:t>	string </a:t>
+            </a:r>
+            <a:r>
+              <a:rPr lang="en-US" b="1" i="1" dirty="0" err="1">
+                <a:latin typeface="Consolas" panose="020B0609020204030204" pitchFamily="49" charset="0"/>
+              </a:rPr>
+              <a:t>Martin_Penev</a:t>
+            </a:r>
+            <a:r>
+              <a:rPr lang="en-US" i="1" dirty="0">
                 <a:latin typeface="Consolas" panose="020B0609020204030204" pitchFamily="49" charset="0"/>
               </a:rPr>
               <a:t>    </a:t>
@@ -10384,72 +10242,7 @@
               <a:rPr lang="en-US" dirty="0">
                 <a:latin typeface="Consolas" panose="020B0609020204030204" pitchFamily="49" charset="0"/>
               </a:rPr>
-              <a:t>	string </a:t>
-            </a:r>
-            <a:r>
-              <a:rPr lang="en-US" b="1" i="1" u="sng" dirty="0">
-                <a:latin typeface="Consolas" panose="020B0609020204030204" pitchFamily="49" charset="0"/>
-              </a:rPr>
-              <a:t>Nikola</a:t>
-            </a:r>
-            <a:r>
-              <a:rPr lang="en-US" i="1" u="sng" dirty="0">
-                <a:latin typeface="Consolas" panose="020B0609020204030204" pitchFamily="49" charset="0"/>
-              </a:rPr>
-              <a:t> </a:t>
-            </a:r>
-            <a:r>
-              <a:rPr lang="en-US" b="1" i="1" u="sng" dirty="0" err="1">
-                <a:latin typeface="Consolas" panose="020B0609020204030204" pitchFamily="49" charset="0"/>
-              </a:rPr>
-              <a:t>Pavlovski</a:t>
-            </a:r>
-            <a:r>
-              <a:rPr lang="en-US" dirty="0">
-                <a:latin typeface="Consolas" panose="020B0609020204030204" pitchFamily="49" charset="0"/>
-              </a:rPr>
-              <a:t>= “programmer3”;</a:t>
-            </a:r>
-          </a:p>
-          <a:p>
-            <a:pPr marL="0" indent="0">
-              <a:buNone/>
-            </a:pPr>
-            <a:r>
-              <a:rPr lang="en-US" dirty="0">
-                <a:latin typeface="Consolas" panose="020B0609020204030204" pitchFamily="49" charset="0"/>
-              </a:rPr>
-              <a:t>	string </a:t>
-            </a:r>
-            <a:r>
-              <a:rPr lang="en-US" b="1" i="1" u="sng" dirty="0">
-                <a:latin typeface="Consolas" panose="020B0609020204030204" pitchFamily="49" charset="0"/>
-              </a:rPr>
-              <a:t>Martin</a:t>
-            </a:r>
-            <a:r>
-              <a:rPr lang="en-US" i="1" u="sng" dirty="0">
-                <a:latin typeface="Consolas" panose="020B0609020204030204" pitchFamily="49" charset="0"/>
-              </a:rPr>
-              <a:t> </a:t>
-            </a:r>
-            <a:r>
-              <a:rPr lang="en-US" b="1" i="1" u="sng" dirty="0" err="1">
-                <a:latin typeface="Consolas" panose="020B0609020204030204" pitchFamily="49" charset="0"/>
-              </a:rPr>
-              <a:t>Penev</a:t>
-            </a:r>
-            <a:r>
-              <a:rPr lang="en-US" i="1" u="sng" dirty="0">
-                <a:latin typeface="Consolas" panose="020B0609020204030204" pitchFamily="49" charset="0"/>
-              </a:rPr>
-              <a:t>    </a:t>
-            </a:r>
-            <a:r>
-              <a:rPr lang="en-US" dirty="0">
-                <a:latin typeface="Consolas" panose="020B0609020204030204" pitchFamily="49" charset="0"/>
-              </a:rPr>
-              <a:t>= “programmer4”;</a:t>
+              <a:t>	return 0;</a:t>
             </a:r>
           </a:p>
           <a:p>
@@ -10489,10 +10282,9 @@
           <a:lstStyle/>
           <a:p>
             <a:r>
-              <a:rPr lang="en-US" dirty="0" smtClean="0"/>
+              <a:rPr lang="en-US" dirty="0"/>
               <a:t>Creators</a:t>
             </a:r>
-            <a:endParaRPr lang="en-US" dirty="0"/>
           </a:p>
         </p:txBody>
       </p:sp>
@@ -10506,25 +10298,18 @@
   <p:clrMapOvr>
     <a:masterClrMapping/>
   </p:clrMapOvr>
-  <mc:AlternateContent xmlns:mc="http://schemas.openxmlformats.org/markup-compatibility/2006">
-    <mc:Choice xmlns:p14="http://schemas.microsoft.com/office/powerpoint/2010/main" Requires="p14">
+  <mc:AlternateContent xmlns:mc="http://schemas.openxmlformats.org/markup-compatibility/2006" xmlns:p14="http://schemas.microsoft.com/office/powerpoint/2010/main">
+    <mc:Choice Requires="p14">
       <p:transition spd="slow" p14:dur="4400">
         <p14:honeycomb/>
       </p:transition>
     </mc:Choice>
-    <mc:Fallback>
+    <mc:Fallback xmlns="">
       <p:transition spd="slow">
         <p:fade/>
       </p:transition>
     </mc:Fallback>
   </mc:AlternateContent>
-  <p:timing>
-    <p:tnLst>
-      <p:par>
-        <p:cTn id="1" dur="indefinite" restart="never" nodeType="tmRoot"/>
-      </p:par>
-    </p:tnLst>
-  </p:timing>
 </p:sld>
 </file>
 

</xml_diff>